<commit_message>
Minor update to lec_19 slides
</commit_message>
<xml_diff>
--- a/tyler/meena/cs220/s22/materials/lecture_ppts/lec_19_S22.pptx
+++ b/tyler/meena/cs220/s22/materials/lecture_ppts/lec_19_S22.pptx
@@ -2154,7 +2154,7 @@
           </a:ln>
           <a:extLst>
             <a:ext uri="{C572A759-6A51-4108-AA02-DFA0A04FC94B}">
-              <ma14:wrappingTextBoxFlag xmlns="" xmlns:m="http://schemas.openxmlformats.org/officeDocument/2006/math" xmlns:a14="http://schemas.microsoft.com/office/drawing/2010/main" xmlns:ma14="http://schemas.microsoft.com/office/mac/drawingml/2011/main" val="1"/>
+              <ma14:wrappingTextBoxFlag xmlns:ma14="http://schemas.microsoft.com/office/mac/drawingml/2011/main" xmlns:a14="http://schemas.microsoft.com/office/drawing/2010/main" xmlns:m="http://schemas.openxmlformats.org/officeDocument/2006/math" xmlns="" val="1"/>
             </a:ext>
           </a:extLst>
         </p:spPr>
@@ -2193,7 +2193,7 @@
           </a:ln>
           <a:extLst>
             <a:ext uri="{C572A759-6A51-4108-AA02-DFA0A04FC94B}">
-              <ma14:wrappingTextBoxFlag xmlns="" xmlns:m="http://schemas.openxmlformats.org/officeDocument/2006/math" xmlns:a14="http://schemas.microsoft.com/office/drawing/2010/main" xmlns:ma14="http://schemas.microsoft.com/office/mac/drawingml/2011/main" val="1"/>
+              <ma14:wrappingTextBoxFlag xmlns:ma14="http://schemas.microsoft.com/office/mac/drawingml/2011/main" xmlns:a14="http://schemas.microsoft.com/office/drawing/2010/main" xmlns:m="http://schemas.openxmlformats.org/officeDocument/2006/math" xmlns="" val="1"/>
             </a:ext>
           </a:extLst>
         </p:spPr>
@@ -3963,7 +3963,7 @@
           </a:ln>
           <a:extLst>
             <a:ext uri="{C572A759-6A51-4108-AA02-DFA0A04FC94B}">
-              <ma14:wrappingTextBoxFlag xmlns="" xmlns:m="http://schemas.openxmlformats.org/officeDocument/2006/math" xmlns:a14="http://schemas.microsoft.com/office/drawing/2010/main" xmlns:ma14="http://schemas.microsoft.com/office/mac/drawingml/2011/main" val="1"/>
+              <ma14:wrappingTextBoxFlag xmlns:ma14="http://schemas.microsoft.com/office/mac/drawingml/2011/main" xmlns:a14="http://schemas.microsoft.com/office/drawing/2010/main" xmlns:m="http://schemas.openxmlformats.org/officeDocument/2006/math" xmlns="" val="1"/>
             </a:ext>
           </a:extLst>
         </p:spPr>
@@ -3998,7 +3998,7 @@
           </a:ln>
           <a:extLst>
             <a:ext uri="{C572A759-6A51-4108-AA02-DFA0A04FC94B}">
-              <ma14:wrappingTextBoxFlag xmlns="" xmlns:m="http://schemas.openxmlformats.org/officeDocument/2006/math" xmlns:a14="http://schemas.microsoft.com/office/drawing/2010/main" xmlns:ma14="http://schemas.microsoft.com/office/mac/drawingml/2011/main" val="1"/>
+              <ma14:wrappingTextBoxFlag xmlns:ma14="http://schemas.microsoft.com/office/mac/drawingml/2011/main" xmlns:a14="http://schemas.microsoft.com/office/drawing/2010/main" xmlns:m="http://schemas.openxmlformats.org/officeDocument/2006/math" xmlns="" val="1"/>
             </a:ext>
           </a:extLst>
         </p:spPr>
@@ -4033,7 +4033,7 @@
           </a:ln>
           <a:extLst>
             <a:ext uri="{C572A759-6A51-4108-AA02-DFA0A04FC94B}">
-              <ma14:wrappingTextBoxFlag xmlns="" xmlns:m="http://schemas.openxmlformats.org/officeDocument/2006/math" xmlns:a14="http://schemas.microsoft.com/office/drawing/2010/main" xmlns:ma14="http://schemas.microsoft.com/office/mac/drawingml/2011/main" val="1"/>
+              <ma14:wrappingTextBoxFlag xmlns:ma14="http://schemas.microsoft.com/office/mac/drawingml/2011/main" xmlns:a14="http://schemas.microsoft.com/office/drawing/2010/main" xmlns:m="http://schemas.openxmlformats.org/officeDocument/2006/math" xmlns="" val="1"/>
             </a:ext>
           </a:extLst>
         </p:spPr>
@@ -4131,7 +4131,7 @@
           </a:ln>
           <a:extLst>
             <a:ext uri="{C572A759-6A51-4108-AA02-DFA0A04FC94B}">
-              <ma14:wrappingTextBoxFlag xmlns="" xmlns:m="http://schemas.openxmlformats.org/officeDocument/2006/math" xmlns:a14="http://schemas.microsoft.com/office/drawing/2010/main" xmlns:ma14="http://schemas.microsoft.com/office/mac/drawingml/2011/main" val="1"/>
+              <ma14:wrappingTextBoxFlag xmlns:ma14="http://schemas.microsoft.com/office/mac/drawingml/2011/main" xmlns:a14="http://schemas.microsoft.com/office/drawing/2010/main" xmlns:m="http://schemas.openxmlformats.org/officeDocument/2006/math" xmlns="" val="1"/>
             </a:ext>
           </a:extLst>
         </p:spPr>
@@ -4200,7 +4200,7 @@
           </a:ln>
           <a:extLst>
             <a:ext uri="{C572A759-6A51-4108-AA02-DFA0A04FC94B}">
-              <ma14:wrappingTextBoxFlag xmlns="" xmlns:m="http://schemas.openxmlformats.org/officeDocument/2006/math" xmlns:a14="http://schemas.microsoft.com/office/drawing/2010/main" xmlns:ma14="http://schemas.microsoft.com/office/mac/drawingml/2011/main" val="1"/>
+              <ma14:wrappingTextBoxFlag xmlns:ma14="http://schemas.microsoft.com/office/mac/drawingml/2011/main" xmlns:a14="http://schemas.microsoft.com/office/drawing/2010/main" xmlns:m="http://schemas.openxmlformats.org/officeDocument/2006/math" xmlns="" val="1"/>
             </a:ext>
           </a:extLst>
         </p:spPr>
@@ -4247,7 +4247,7 @@
           </a:ln>
           <a:extLst>
             <a:ext uri="{C572A759-6A51-4108-AA02-DFA0A04FC94B}">
-              <ma14:wrappingTextBoxFlag xmlns="" xmlns:m="http://schemas.openxmlformats.org/officeDocument/2006/math" xmlns:a14="http://schemas.microsoft.com/office/drawing/2010/main" xmlns:ma14="http://schemas.microsoft.com/office/mac/drawingml/2011/main" val="1"/>
+              <ma14:wrappingTextBoxFlag xmlns:ma14="http://schemas.microsoft.com/office/mac/drawingml/2011/main" xmlns:a14="http://schemas.microsoft.com/office/drawing/2010/main" xmlns:m="http://schemas.openxmlformats.org/officeDocument/2006/math" xmlns="" val="1"/>
             </a:ext>
           </a:extLst>
         </p:spPr>
@@ -4294,7 +4294,7 @@
           </a:ln>
           <a:extLst>
             <a:ext uri="{C572A759-6A51-4108-AA02-DFA0A04FC94B}">
-              <ma14:wrappingTextBoxFlag xmlns="" xmlns:m="http://schemas.openxmlformats.org/officeDocument/2006/math" xmlns:a14="http://schemas.microsoft.com/office/drawing/2010/main" xmlns:ma14="http://schemas.microsoft.com/office/mac/drawingml/2011/main" val="1"/>
+              <ma14:wrappingTextBoxFlag xmlns:ma14="http://schemas.microsoft.com/office/mac/drawingml/2011/main" xmlns:a14="http://schemas.microsoft.com/office/drawing/2010/main" xmlns:m="http://schemas.openxmlformats.org/officeDocument/2006/math" xmlns="" val="1"/>
             </a:ext>
           </a:extLst>
         </p:spPr>
@@ -4480,7 +4480,7 @@
           </a:ln>
           <a:extLst>
             <a:ext uri="{C572A759-6A51-4108-AA02-DFA0A04FC94B}">
-              <ma14:wrappingTextBoxFlag xmlns="" xmlns:m="http://schemas.openxmlformats.org/officeDocument/2006/math" xmlns:a14="http://schemas.microsoft.com/office/drawing/2010/main" xmlns:ma14="http://schemas.microsoft.com/office/mac/drawingml/2011/main" val="1"/>
+              <ma14:wrappingTextBoxFlag xmlns:ma14="http://schemas.microsoft.com/office/mac/drawingml/2011/main" xmlns:a14="http://schemas.microsoft.com/office/drawing/2010/main" xmlns:m="http://schemas.openxmlformats.org/officeDocument/2006/math" xmlns="" val="1"/>
             </a:ext>
           </a:extLst>
         </p:spPr>
@@ -4572,7 +4572,7 @@
           </a:ln>
           <a:extLst>
             <a:ext uri="{C572A759-6A51-4108-AA02-DFA0A04FC94B}">
-              <ma14:wrappingTextBoxFlag xmlns="" xmlns:m="http://schemas.openxmlformats.org/officeDocument/2006/math" xmlns:a14="http://schemas.microsoft.com/office/drawing/2010/main" xmlns:ma14="http://schemas.microsoft.com/office/mac/drawingml/2011/main" val="1"/>
+              <ma14:wrappingTextBoxFlag xmlns:ma14="http://schemas.microsoft.com/office/mac/drawingml/2011/main" xmlns:a14="http://schemas.microsoft.com/office/drawing/2010/main" xmlns:m="http://schemas.openxmlformats.org/officeDocument/2006/math" xmlns="" val="1"/>
             </a:ext>
           </a:extLst>
         </p:spPr>
@@ -4697,7 +4697,7 @@
           </a:ln>
           <a:extLst>
             <a:ext uri="{C572A759-6A51-4108-AA02-DFA0A04FC94B}">
-              <ma14:wrappingTextBoxFlag xmlns="" xmlns:m="http://schemas.openxmlformats.org/officeDocument/2006/math" xmlns:a14="http://schemas.microsoft.com/office/drawing/2010/main" xmlns:ma14="http://schemas.microsoft.com/office/mac/drawingml/2011/main" val="1"/>
+              <ma14:wrappingTextBoxFlag xmlns:ma14="http://schemas.microsoft.com/office/mac/drawingml/2011/main" xmlns:a14="http://schemas.microsoft.com/office/drawing/2010/main" xmlns:m="http://schemas.openxmlformats.org/officeDocument/2006/math" xmlns="" val="1"/>
             </a:ext>
           </a:extLst>
         </p:spPr>
@@ -4807,7 +4807,7 @@
           </a:ln>
           <a:extLst>
             <a:ext uri="{C572A759-6A51-4108-AA02-DFA0A04FC94B}">
-              <ma14:wrappingTextBoxFlag xmlns="" xmlns:m="http://schemas.openxmlformats.org/officeDocument/2006/math" xmlns:a14="http://schemas.microsoft.com/office/drawing/2010/main" xmlns:ma14="http://schemas.microsoft.com/office/mac/drawingml/2011/main" val="1"/>
+              <ma14:wrappingTextBoxFlag xmlns:ma14="http://schemas.microsoft.com/office/mac/drawingml/2011/main" xmlns:a14="http://schemas.microsoft.com/office/drawing/2010/main" xmlns:m="http://schemas.openxmlformats.org/officeDocument/2006/math" xmlns="" val="1"/>
             </a:ext>
           </a:extLst>
         </p:spPr>
@@ -4925,7 +4925,7 @@
           </a:ln>
           <a:extLst>
             <a:ext uri="{C572A759-6A51-4108-AA02-DFA0A04FC94B}">
-              <ma14:wrappingTextBoxFlag xmlns="" xmlns:m="http://schemas.openxmlformats.org/officeDocument/2006/math" xmlns:a14="http://schemas.microsoft.com/office/drawing/2010/main" xmlns:ma14="http://schemas.microsoft.com/office/mac/drawingml/2011/main" val="1"/>
+              <ma14:wrappingTextBoxFlag xmlns:ma14="http://schemas.microsoft.com/office/mac/drawingml/2011/main" xmlns:a14="http://schemas.microsoft.com/office/drawing/2010/main" xmlns:m="http://schemas.openxmlformats.org/officeDocument/2006/math" xmlns="" val="1"/>
             </a:ext>
           </a:extLst>
         </p:spPr>
@@ -5117,7 +5117,7 @@
           </a:ln>
           <a:extLst>
             <a:ext uri="{C572A759-6A51-4108-AA02-DFA0A04FC94B}">
-              <ma14:wrappingTextBoxFlag xmlns="" xmlns:m="http://schemas.openxmlformats.org/officeDocument/2006/math" xmlns:a14="http://schemas.microsoft.com/office/drawing/2010/main" xmlns:ma14="http://schemas.microsoft.com/office/mac/drawingml/2011/main" val="1"/>
+              <ma14:wrappingTextBoxFlag xmlns:ma14="http://schemas.microsoft.com/office/mac/drawingml/2011/main" xmlns:a14="http://schemas.microsoft.com/office/drawing/2010/main" xmlns:m="http://schemas.openxmlformats.org/officeDocument/2006/math" xmlns="" val="1"/>
             </a:ext>
           </a:extLst>
         </p:spPr>
@@ -5152,7 +5152,7 @@
           </a:ln>
           <a:extLst>
             <a:ext uri="{C572A759-6A51-4108-AA02-DFA0A04FC94B}">
-              <ma14:wrappingTextBoxFlag xmlns="" xmlns:m="http://schemas.openxmlformats.org/officeDocument/2006/math" xmlns:a14="http://schemas.microsoft.com/office/drawing/2010/main" xmlns:ma14="http://schemas.microsoft.com/office/mac/drawingml/2011/main" val="1"/>
+              <ma14:wrappingTextBoxFlag xmlns:ma14="http://schemas.microsoft.com/office/mac/drawingml/2011/main" xmlns:a14="http://schemas.microsoft.com/office/drawing/2010/main" xmlns:m="http://schemas.openxmlformats.org/officeDocument/2006/math" xmlns="" val="1"/>
             </a:ext>
           </a:extLst>
         </p:spPr>
@@ -5187,7 +5187,7 @@
           </a:ln>
           <a:extLst>
             <a:ext uri="{C572A759-6A51-4108-AA02-DFA0A04FC94B}">
-              <ma14:wrappingTextBoxFlag xmlns="" xmlns:m="http://schemas.openxmlformats.org/officeDocument/2006/math" xmlns:a14="http://schemas.microsoft.com/office/drawing/2010/main" xmlns:ma14="http://schemas.microsoft.com/office/mac/drawingml/2011/main" val="1"/>
+              <ma14:wrappingTextBoxFlag xmlns:ma14="http://schemas.microsoft.com/office/mac/drawingml/2011/main" xmlns:a14="http://schemas.microsoft.com/office/drawing/2010/main" xmlns:m="http://schemas.openxmlformats.org/officeDocument/2006/math" xmlns="" val="1"/>
             </a:ext>
           </a:extLst>
         </p:spPr>
@@ -5285,7 +5285,7 @@
           </a:ln>
           <a:extLst>
             <a:ext uri="{C572A759-6A51-4108-AA02-DFA0A04FC94B}">
-              <ma14:wrappingTextBoxFlag xmlns="" xmlns:m="http://schemas.openxmlformats.org/officeDocument/2006/math" xmlns:a14="http://schemas.microsoft.com/office/drawing/2010/main" xmlns:ma14="http://schemas.microsoft.com/office/mac/drawingml/2011/main" val="1"/>
+              <ma14:wrappingTextBoxFlag xmlns:ma14="http://schemas.microsoft.com/office/mac/drawingml/2011/main" xmlns:a14="http://schemas.microsoft.com/office/drawing/2010/main" xmlns:m="http://schemas.openxmlformats.org/officeDocument/2006/math" xmlns="" val="1"/>
             </a:ext>
           </a:extLst>
         </p:spPr>
@@ -5354,7 +5354,7 @@
           </a:ln>
           <a:extLst>
             <a:ext uri="{C572A759-6A51-4108-AA02-DFA0A04FC94B}">
-              <ma14:wrappingTextBoxFlag xmlns="" xmlns:m="http://schemas.openxmlformats.org/officeDocument/2006/math" xmlns:a14="http://schemas.microsoft.com/office/drawing/2010/main" xmlns:ma14="http://schemas.microsoft.com/office/mac/drawingml/2011/main" val="1"/>
+              <ma14:wrappingTextBoxFlag xmlns:ma14="http://schemas.microsoft.com/office/mac/drawingml/2011/main" xmlns:a14="http://schemas.microsoft.com/office/drawing/2010/main" xmlns:m="http://schemas.openxmlformats.org/officeDocument/2006/math" xmlns="" val="1"/>
             </a:ext>
           </a:extLst>
         </p:spPr>
@@ -5401,7 +5401,7 @@
           </a:ln>
           <a:extLst>
             <a:ext uri="{C572A759-6A51-4108-AA02-DFA0A04FC94B}">
-              <ma14:wrappingTextBoxFlag xmlns="" xmlns:m="http://schemas.openxmlformats.org/officeDocument/2006/math" xmlns:a14="http://schemas.microsoft.com/office/drawing/2010/main" xmlns:ma14="http://schemas.microsoft.com/office/mac/drawingml/2011/main" val="1"/>
+              <ma14:wrappingTextBoxFlag xmlns:ma14="http://schemas.microsoft.com/office/mac/drawingml/2011/main" xmlns:a14="http://schemas.microsoft.com/office/drawing/2010/main" xmlns:m="http://schemas.openxmlformats.org/officeDocument/2006/math" xmlns="" val="1"/>
             </a:ext>
           </a:extLst>
         </p:spPr>
@@ -5448,7 +5448,7 @@
           </a:ln>
           <a:extLst>
             <a:ext uri="{C572A759-6A51-4108-AA02-DFA0A04FC94B}">
-              <ma14:wrappingTextBoxFlag xmlns="" xmlns:m="http://schemas.openxmlformats.org/officeDocument/2006/math" xmlns:a14="http://schemas.microsoft.com/office/drawing/2010/main" xmlns:ma14="http://schemas.microsoft.com/office/mac/drawingml/2011/main" val="1"/>
+              <ma14:wrappingTextBoxFlag xmlns:ma14="http://schemas.microsoft.com/office/mac/drawingml/2011/main" xmlns:a14="http://schemas.microsoft.com/office/drawing/2010/main" xmlns:m="http://schemas.openxmlformats.org/officeDocument/2006/math" xmlns="" val="1"/>
             </a:ext>
           </a:extLst>
         </p:spPr>
@@ -5634,7 +5634,7 @@
           </a:ln>
           <a:extLst>
             <a:ext uri="{C572A759-6A51-4108-AA02-DFA0A04FC94B}">
-              <ma14:wrappingTextBoxFlag xmlns="" xmlns:m="http://schemas.openxmlformats.org/officeDocument/2006/math" xmlns:a14="http://schemas.microsoft.com/office/drawing/2010/main" xmlns:ma14="http://schemas.microsoft.com/office/mac/drawingml/2011/main" val="1"/>
+              <ma14:wrappingTextBoxFlag xmlns:ma14="http://schemas.microsoft.com/office/mac/drawingml/2011/main" xmlns:a14="http://schemas.microsoft.com/office/drawing/2010/main" xmlns:m="http://schemas.openxmlformats.org/officeDocument/2006/math" xmlns="" val="1"/>
             </a:ext>
           </a:extLst>
         </p:spPr>
@@ -5726,7 +5726,7 @@
           </a:ln>
           <a:extLst>
             <a:ext uri="{C572A759-6A51-4108-AA02-DFA0A04FC94B}">
-              <ma14:wrappingTextBoxFlag xmlns="" xmlns:m="http://schemas.openxmlformats.org/officeDocument/2006/math" xmlns:a14="http://schemas.microsoft.com/office/drawing/2010/main" xmlns:ma14="http://schemas.microsoft.com/office/mac/drawingml/2011/main" val="1"/>
+              <ma14:wrappingTextBoxFlag xmlns:ma14="http://schemas.microsoft.com/office/mac/drawingml/2011/main" xmlns:a14="http://schemas.microsoft.com/office/drawing/2010/main" xmlns:m="http://schemas.openxmlformats.org/officeDocument/2006/math" xmlns="" val="1"/>
             </a:ext>
           </a:extLst>
         </p:spPr>
@@ -5851,7 +5851,7 @@
           </a:ln>
           <a:extLst>
             <a:ext uri="{C572A759-6A51-4108-AA02-DFA0A04FC94B}">
-              <ma14:wrappingTextBoxFlag xmlns="" xmlns:m="http://schemas.openxmlformats.org/officeDocument/2006/math" xmlns:a14="http://schemas.microsoft.com/office/drawing/2010/main" xmlns:ma14="http://schemas.microsoft.com/office/mac/drawingml/2011/main" val="1"/>
+              <ma14:wrappingTextBoxFlag xmlns:ma14="http://schemas.microsoft.com/office/mac/drawingml/2011/main" xmlns:a14="http://schemas.microsoft.com/office/drawing/2010/main" xmlns:m="http://schemas.openxmlformats.org/officeDocument/2006/math" xmlns="" val="1"/>
             </a:ext>
           </a:extLst>
         </p:spPr>
@@ -5961,7 +5961,7 @@
           </a:ln>
           <a:extLst>
             <a:ext uri="{C572A759-6A51-4108-AA02-DFA0A04FC94B}">
-              <ma14:wrappingTextBoxFlag xmlns="" xmlns:m="http://schemas.openxmlformats.org/officeDocument/2006/math" xmlns:a14="http://schemas.microsoft.com/office/drawing/2010/main" xmlns:ma14="http://schemas.microsoft.com/office/mac/drawingml/2011/main" val="1"/>
+              <ma14:wrappingTextBoxFlag xmlns:ma14="http://schemas.microsoft.com/office/mac/drawingml/2011/main" xmlns:a14="http://schemas.microsoft.com/office/drawing/2010/main" xmlns:m="http://schemas.openxmlformats.org/officeDocument/2006/math" xmlns="" val="1"/>
             </a:ext>
           </a:extLst>
         </p:spPr>
@@ -6079,7 +6079,7 @@
           </a:ln>
           <a:extLst>
             <a:ext uri="{C572A759-6A51-4108-AA02-DFA0A04FC94B}">
-              <ma14:wrappingTextBoxFlag xmlns="" xmlns:m="http://schemas.openxmlformats.org/officeDocument/2006/math" xmlns:a14="http://schemas.microsoft.com/office/drawing/2010/main" xmlns:ma14="http://schemas.microsoft.com/office/mac/drawingml/2011/main" val="1"/>
+              <ma14:wrappingTextBoxFlag xmlns:ma14="http://schemas.microsoft.com/office/mac/drawingml/2011/main" xmlns:a14="http://schemas.microsoft.com/office/drawing/2010/main" xmlns:m="http://schemas.openxmlformats.org/officeDocument/2006/math" xmlns="" val="1"/>
             </a:ext>
           </a:extLst>
         </p:spPr>
@@ -6768,7 +6768,7 @@
           </a:ln>
           <a:extLst>
             <a:ext uri="{C572A759-6A51-4108-AA02-DFA0A04FC94B}">
-              <ma14:wrappingTextBoxFlag xmlns="" xmlns:m="http://schemas.openxmlformats.org/officeDocument/2006/math" xmlns:a14="http://schemas.microsoft.com/office/drawing/2010/main" xmlns:ma14="http://schemas.microsoft.com/office/mac/drawingml/2011/main" val="1"/>
+              <ma14:wrappingTextBoxFlag xmlns:ma14="http://schemas.microsoft.com/office/mac/drawingml/2011/main" xmlns:a14="http://schemas.microsoft.com/office/drawing/2010/main" xmlns:m="http://schemas.openxmlformats.org/officeDocument/2006/math" xmlns="" val="1"/>
             </a:ext>
           </a:extLst>
         </p:spPr>
@@ -6927,7 +6927,7 @@
           </a:ln>
           <a:extLst>
             <a:ext uri="{C572A759-6A51-4108-AA02-DFA0A04FC94B}">
-              <ma14:wrappingTextBoxFlag xmlns="" xmlns:m="http://schemas.openxmlformats.org/officeDocument/2006/math" xmlns:a14="http://schemas.microsoft.com/office/drawing/2010/main" xmlns:ma14="http://schemas.microsoft.com/office/mac/drawingml/2011/main" val="1"/>
+              <ma14:wrappingTextBoxFlag xmlns:ma14="http://schemas.microsoft.com/office/mac/drawingml/2011/main" xmlns:a14="http://schemas.microsoft.com/office/drawing/2010/main" xmlns:m="http://schemas.openxmlformats.org/officeDocument/2006/math" xmlns="" val="1"/>
             </a:ext>
           </a:extLst>
         </p:spPr>
@@ -6962,7 +6962,7 @@
           </a:ln>
           <a:extLst>
             <a:ext uri="{C572A759-6A51-4108-AA02-DFA0A04FC94B}">
-              <ma14:wrappingTextBoxFlag xmlns="" xmlns:m="http://schemas.openxmlformats.org/officeDocument/2006/math" xmlns:a14="http://schemas.microsoft.com/office/drawing/2010/main" xmlns:ma14="http://schemas.microsoft.com/office/mac/drawingml/2011/main" val="1"/>
+              <ma14:wrappingTextBoxFlag xmlns:ma14="http://schemas.microsoft.com/office/mac/drawingml/2011/main" xmlns:a14="http://schemas.microsoft.com/office/drawing/2010/main" xmlns:m="http://schemas.openxmlformats.org/officeDocument/2006/math" xmlns="" val="1"/>
             </a:ext>
           </a:extLst>
         </p:spPr>
@@ -7131,7 +7131,7 @@
           </a:ln>
           <a:extLst>
             <a:ext uri="{C572A759-6A51-4108-AA02-DFA0A04FC94B}">
-              <ma14:wrappingTextBoxFlag xmlns="" xmlns:m="http://schemas.openxmlformats.org/officeDocument/2006/math" xmlns:a14="http://schemas.microsoft.com/office/drawing/2010/main" xmlns:ma14="http://schemas.microsoft.com/office/mac/drawingml/2011/main" val="1"/>
+              <ma14:wrappingTextBoxFlag xmlns:ma14="http://schemas.microsoft.com/office/mac/drawingml/2011/main" xmlns:a14="http://schemas.microsoft.com/office/drawing/2010/main" xmlns:m="http://schemas.openxmlformats.org/officeDocument/2006/math" xmlns="" val="1"/>
             </a:ext>
           </a:extLst>
         </p:spPr>
@@ -7228,7 +7228,7 @@
           </a:ln>
           <a:extLst>
             <a:ext uri="{C572A759-6A51-4108-AA02-DFA0A04FC94B}">
-              <ma14:wrappingTextBoxFlag xmlns="" xmlns:m="http://schemas.openxmlformats.org/officeDocument/2006/math" xmlns:a14="http://schemas.microsoft.com/office/drawing/2010/main" xmlns:ma14="http://schemas.microsoft.com/office/mac/drawingml/2011/main" val="1"/>
+              <ma14:wrappingTextBoxFlag xmlns:ma14="http://schemas.microsoft.com/office/mac/drawingml/2011/main" xmlns:a14="http://schemas.microsoft.com/office/drawing/2010/main" xmlns:m="http://schemas.openxmlformats.org/officeDocument/2006/math" xmlns="" val="1"/>
             </a:ext>
           </a:extLst>
         </p:spPr>
@@ -7270,7 +7270,7 @@
           </a:ln>
           <a:extLst>
             <a:ext uri="{C572A759-6A51-4108-AA02-DFA0A04FC94B}">
-              <ma14:wrappingTextBoxFlag xmlns="" xmlns:m="http://schemas.openxmlformats.org/officeDocument/2006/math" xmlns:a14="http://schemas.microsoft.com/office/drawing/2010/main" xmlns:ma14="http://schemas.microsoft.com/office/mac/drawingml/2011/main" val="1"/>
+              <ma14:wrappingTextBoxFlag xmlns:ma14="http://schemas.microsoft.com/office/mac/drawingml/2011/main" xmlns:a14="http://schemas.microsoft.com/office/drawing/2010/main" xmlns:m="http://schemas.openxmlformats.org/officeDocument/2006/math" xmlns="" val="1"/>
             </a:ext>
           </a:extLst>
         </p:spPr>
@@ -7317,7 +7317,7 @@
           </a:ln>
           <a:extLst>
             <a:ext uri="{C572A759-6A51-4108-AA02-DFA0A04FC94B}">
-              <ma14:wrappingTextBoxFlag xmlns="" xmlns:m="http://schemas.openxmlformats.org/officeDocument/2006/math" xmlns:a14="http://schemas.microsoft.com/office/drawing/2010/main" xmlns:ma14="http://schemas.microsoft.com/office/mac/drawingml/2011/main" val="1"/>
+              <ma14:wrappingTextBoxFlag xmlns:ma14="http://schemas.microsoft.com/office/mac/drawingml/2011/main" xmlns:a14="http://schemas.microsoft.com/office/drawing/2010/main" xmlns:m="http://schemas.openxmlformats.org/officeDocument/2006/math" xmlns="" val="1"/>
             </a:ext>
           </a:extLst>
         </p:spPr>
@@ -7406,7 +7406,7 @@
           </a:ln>
           <a:extLst>
             <a:ext uri="{C572A759-6A51-4108-AA02-DFA0A04FC94B}">
-              <ma14:wrappingTextBoxFlag xmlns="" xmlns:m="http://schemas.openxmlformats.org/officeDocument/2006/math" xmlns:a14="http://schemas.microsoft.com/office/drawing/2010/main" xmlns:ma14="http://schemas.microsoft.com/office/mac/drawingml/2011/main" val="1"/>
+              <ma14:wrappingTextBoxFlag xmlns:ma14="http://schemas.microsoft.com/office/mac/drawingml/2011/main" xmlns:a14="http://schemas.microsoft.com/office/drawing/2010/main" xmlns:m="http://schemas.openxmlformats.org/officeDocument/2006/math" xmlns="" val="1"/>
             </a:ext>
           </a:extLst>
         </p:spPr>
@@ -7481,7 +7481,7 @@
           </a:ln>
           <a:extLst>
             <a:ext uri="{C572A759-6A51-4108-AA02-DFA0A04FC94B}">
-              <ma14:wrappingTextBoxFlag xmlns="" xmlns:m="http://schemas.openxmlformats.org/officeDocument/2006/math" xmlns:a14="http://schemas.microsoft.com/office/drawing/2010/main" xmlns:ma14="http://schemas.microsoft.com/office/mac/drawingml/2011/main" val="1"/>
+              <ma14:wrappingTextBoxFlag xmlns:ma14="http://schemas.microsoft.com/office/mac/drawingml/2011/main" xmlns:a14="http://schemas.microsoft.com/office/drawing/2010/main" xmlns:m="http://schemas.openxmlformats.org/officeDocument/2006/math" xmlns="" val="1"/>
             </a:ext>
           </a:extLst>
         </p:spPr>
@@ -7523,7 +7523,7 @@
           </a:ln>
           <a:extLst>
             <a:ext uri="{C572A759-6A51-4108-AA02-DFA0A04FC94B}">
-              <ma14:wrappingTextBoxFlag xmlns="" xmlns:m="http://schemas.openxmlformats.org/officeDocument/2006/math" xmlns:a14="http://schemas.microsoft.com/office/drawing/2010/main" xmlns:ma14="http://schemas.microsoft.com/office/mac/drawingml/2011/main" val="1"/>
+              <ma14:wrappingTextBoxFlag xmlns:ma14="http://schemas.microsoft.com/office/mac/drawingml/2011/main" xmlns:a14="http://schemas.microsoft.com/office/drawing/2010/main" xmlns:m="http://schemas.openxmlformats.org/officeDocument/2006/math" xmlns="" val="1"/>
             </a:ext>
           </a:extLst>
         </p:spPr>
@@ -7753,7 +7753,7 @@
           </a:ln>
           <a:extLst>
             <a:ext uri="{C572A759-6A51-4108-AA02-DFA0A04FC94B}">
-              <ma14:wrappingTextBoxFlag xmlns="" xmlns:m="http://schemas.openxmlformats.org/officeDocument/2006/math" xmlns:a14="http://schemas.microsoft.com/office/drawing/2010/main" xmlns:ma14="http://schemas.microsoft.com/office/mac/drawingml/2011/main" val="1"/>
+              <ma14:wrappingTextBoxFlag xmlns:ma14="http://schemas.microsoft.com/office/mac/drawingml/2011/main" xmlns:a14="http://schemas.microsoft.com/office/drawing/2010/main" xmlns:m="http://schemas.openxmlformats.org/officeDocument/2006/math" xmlns="" val="1"/>
             </a:ext>
           </a:extLst>
         </p:spPr>
@@ -7788,7 +7788,7 @@
           </a:ln>
           <a:extLst>
             <a:ext uri="{C572A759-6A51-4108-AA02-DFA0A04FC94B}">
-              <ma14:wrappingTextBoxFlag xmlns="" xmlns:m="http://schemas.openxmlformats.org/officeDocument/2006/math" xmlns:a14="http://schemas.microsoft.com/office/drawing/2010/main" xmlns:ma14="http://schemas.microsoft.com/office/mac/drawingml/2011/main" val="1"/>
+              <ma14:wrappingTextBoxFlag xmlns:ma14="http://schemas.microsoft.com/office/mac/drawingml/2011/main" xmlns:a14="http://schemas.microsoft.com/office/drawing/2010/main" xmlns:m="http://schemas.openxmlformats.org/officeDocument/2006/math" xmlns="" val="1"/>
             </a:ext>
           </a:extLst>
         </p:spPr>
@@ -7957,7 +7957,7 @@
           </a:ln>
           <a:extLst>
             <a:ext uri="{C572A759-6A51-4108-AA02-DFA0A04FC94B}">
-              <ma14:wrappingTextBoxFlag xmlns="" xmlns:m="http://schemas.openxmlformats.org/officeDocument/2006/math" xmlns:a14="http://schemas.microsoft.com/office/drawing/2010/main" xmlns:ma14="http://schemas.microsoft.com/office/mac/drawingml/2011/main" val="1"/>
+              <ma14:wrappingTextBoxFlag xmlns:ma14="http://schemas.microsoft.com/office/mac/drawingml/2011/main" xmlns:a14="http://schemas.microsoft.com/office/drawing/2010/main" xmlns:m="http://schemas.openxmlformats.org/officeDocument/2006/math" xmlns="" val="1"/>
             </a:ext>
           </a:extLst>
         </p:spPr>
@@ -8054,7 +8054,7 @@
           </a:ln>
           <a:extLst>
             <a:ext uri="{C572A759-6A51-4108-AA02-DFA0A04FC94B}">
-              <ma14:wrappingTextBoxFlag xmlns="" xmlns:m="http://schemas.openxmlformats.org/officeDocument/2006/math" xmlns:a14="http://schemas.microsoft.com/office/drawing/2010/main" xmlns:ma14="http://schemas.microsoft.com/office/mac/drawingml/2011/main" val="1"/>
+              <ma14:wrappingTextBoxFlag xmlns:ma14="http://schemas.microsoft.com/office/mac/drawingml/2011/main" xmlns:a14="http://schemas.microsoft.com/office/drawing/2010/main" xmlns:m="http://schemas.openxmlformats.org/officeDocument/2006/math" xmlns="" val="1"/>
             </a:ext>
           </a:extLst>
         </p:spPr>
@@ -8096,7 +8096,7 @@
           </a:ln>
           <a:extLst>
             <a:ext uri="{C572A759-6A51-4108-AA02-DFA0A04FC94B}">
-              <ma14:wrappingTextBoxFlag xmlns="" xmlns:m="http://schemas.openxmlformats.org/officeDocument/2006/math" xmlns:a14="http://schemas.microsoft.com/office/drawing/2010/main" xmlns:ma14="http://schemas.microsoft.com/office/mac/drawingml/2011/main" val="1"/>
+              <ma14:wrappingTextBoxFlag xmlns:ma14="http://schemas.microsoft.com/office/mac/drawingml/2011/main" xmlns:a14="http://schemas.microsoft.com/office/drawing/2010/main" xmlns:m="http://schemas.openxmlformats.org/officeDocument/2006/math" xmlns="" val="1"/>
             </a:ext>
           </a:extLst>
         </p:spPr>
@@ -8143,7 +8143,7 @@
           </a:ln>
           <a:extLst>
             <a:ext uri="{C572A759-6A51-4108-AA02-DFA0A04FC94B}">
-              <ma14:wrappingTextBoxFlag xmlns="" xmlns:m="http://schemas.openxmlformats.org/officeDocument/2006/math" xmlns:a14="http://schemas.microsoft.com/office/drawing/2010/main" xmlns:ma14="http://schemas.microsoft.com/office/mac/drawingml/2011/main" val="1"/>
+              <ma14:wrappingTextBoxFlag xmlns:ma14="http://schemas.microsoft.com/office/mac/drawingml/2011/main" xmlns:a14="http://schemas.microsoft.com/office/drawing/2010/main" xmlns:m="http://schemas.openxmlformats.org/officeDocument/2006/math" xmlns="" val="1"/>
             </a:ext>
           </a:extLst>
         </p:spPr>
@@ -8232,7 +8232,7 @@
           </a:ln>
           <a:extLst>
             <a:ext uri="{C572A759-6A51-4108-AA02-DFA0A04FC94B}">
-              <ma14:wrappingTextBoxFlag xmlns="" xmlns:m="http://schemas.openxmlformats.org/officeDocument/2006/math" xmlns:a14="http://schemas.microsoft.com/office/drawing/2010/main" xmlns:ma14="http://schemas.microsoft.com/office/mac/drawingml/2011/main" val="1"/>
+              <ma14:wrappingTextBoxFlag xmlns:ma14="http://schemas.microsoft.com/office/mac/drawingml/2011/main" xmlns:a14="http://schemas.microsoft.com/office/drawing/2010/main" xmlns:m="http://schemas.openxmlformats.org/officeDocument/2006/math" xmlns="" val="1"/>
             </a:ext>
           </a:extLst>
         </p:spPr>
@@ -8349,7 +8349,7 @@
           </a:ln>
           <a:extLst>
             <a:ext uri="{C572A759-6A51-4108-AA02-DFA0A04FC94B}">
-              <ma14:wrappingTextBoxFlag xmlns="" xmlns:m="http://schemas.openxmlformats.org/officeDocument/2006/math" xmlns:a14="http://schemas.microsoft.com/office/drawing/2010/main" xmlns:ma14="http://schemas.microsoft.com/office/mac/drawingml/2011/main" val="1"/>
+              <ma14:wrappingTextBoxFlag xmlns:ma14="http://schemas.microsoft.com/office/mac/drawingml/2011/main" xmlns:a14="http://schemas.microsoft.com/office/drawing/2010/main" xmlns:m="http://schemas.openxmlformats.org/officeDocument/2006/math" xmlns="" val="1"/>
             </a:ext>
           </a:extLst>
         </p:spPr>
@@ -8391,7 +8391,7 @@
           </a:ln>
           <a:extLst>
             <a:ext uri="{C572A759-6A51-4108-AA02-DFA0A04FC94B}">
-              <ma14:wrappingTextBoxFlag xmlns="" xmlns:m="http://schemas.openxmlformats.org/officeDocument/2006/math" xmlns:a14="http://schemas.microsoft.com/office/drawing/2010/main" xmlns:ma14="http://schemas.microsoft.com/office/mac/drawingml/2011/main" val="1"/>
+              <ma14:wrappingTextBoxFlag xmlns:ma14="http://schemas.microsoft.com/office/mac/drawingml/2011/main" xmlns:a14="http://schemas.microsoft.com/office/drawing/2010/main" xmlns:m="http://schemas.openxmlformats.org/officeDocument/2006/math" xmlns="" val="1"/>
             </a:ext>
           </a:extLst>
         </p:spPr>
@@ -8501,7 +8501,7 @@
           </a:ln>
           <a:extLst>
             <a:ext uri="{C572A759-6A51-4108-AA02-DFA0A04FC94B}">
-              <ma14:wrappingTextBoxFlag xmlns="" xmlns:m="http://schemas.openxmlformats.org/officeDocument/2006/math" xmlns:a14="http://schemas.microsoft.com/office/drawing/2010/main" xmlns:ma14="http://schemas.microsoft.com/office/mac/drawingml/2011/main" val="1"/>
+              <ma14:wrappingTextBoxFlag xmlns:ma14="http://schemas.microsoft.com/office/mac/drawingml/2011/main" xmlns:a14="http://schemas.microsoft.com/office/drawing/2010/main" xmlns:m="http://schemas.openxmlformats.org/officeDocument/2006/math" xmlns="" val="1"/>
             </a:ext>
           </a:extLst>
         </p:spPr>
@@ -8651,7 +8651,7 @@
           </a:ln>
           <a:extLst>
             <a:ext uri="{C572A759-6A51-4108-AA02-DFA0A04FC94B}">
-              <ma14:wrappingTextBoxFlag xmlns="" xmlns:m="http://schemas.openxmlformats.org/officeDocument/2006/math" xmlns:a14="http://schemas.microsoft.com/office/drawing/2010/main" xmlns:ma14="http://schemas.microsoft.com/office/mac/drawingml/2011/main" val="1"/>
+              <ma14:wrappingTextBoxFlag xmlns:ma14="http://schemas.microsoft.com/office/mac/drawingml/2011/main" xmlns:a14="http://schemas.microsoft.com/office/drawing/2010/main" xmlns:m="http://schemas.openxmlformats.org/officeDocument/2006/math" xmlns="" val="1"/>
             </a:ext>
           </a:extLst>
         </p:spPr>
@@ -8713,7 +8713,7 @@
           </a:effectLst>
           <a:extLst>
             <a:ext uri="{C572A759-6A51-4108-AA02-DFA0A04FC94B}">
-              <ma14:wrappingTextBoxFlag xmlns="" xmlns:m="http://schemas.openxmlformats.org/officeDocument/2006/math" xmlns:a14="http://schemas.microsoft.com/office/drawing/2010/main" xmlns:ma14="http://schemas.microsoft.com/office/mac/drawingml/2011/main" val="1"/>
+              <ma14:wrappingTextBoxFlag xmlns:ma14="http://schemas.microsoft.com/office/mac/drawingml/2011/main" xmlns:a14="http://schemas.microsoft.com/office/drawing/2010/main" xmlns:m="http://schemas.openxmlformats.org/officeDocument/2006/math" xmlns="" val="1"/>
             </a:ext>
           </a:extLst>
         </p:spPr>
@@ -8770,7 +8770,7 @@
           </a:effectLst>
           <a:extLst>
             <a:ext uri="{C572A759-6A51-4108-AA02-DFA0A04FC94B}">
-              <ma14:wrappingTextBoxFlag xmlns="" xmlns:m="http://schemas.openxmlformats.org/officeDocument/2006/math" xmlns:a14="http://schemas.microsoft.com/office/drawing/2010/main" xmlns:ma14="http://schemas.microsoft.com/office/mac/drawingml/2011/main" val="1"/>
+              <ma14:wrappingTextBoxFlag xmlns:ma14="http://schemas.microsoft.com/office/mac/drawingml/2011/main" xmlns:a14="http://schemas.microsoft.com/office/drawing/2010/main" xmlns:m="http://schemas.openxmlformats.org/officeDocument/2006/math" xmlns="" val="1"/>
             </a:ext>
           </a:extLst>
         </p:spPr>
@@ -8812,7 +8812,7 @@
           </a:ln>
           <a:extLst>
             <a:ext uri="{C572A759-6A51-4108-AA02-DFA0A04FC94B}">
-              <ma14:wrappingTextBoxFlag xmlns="" xmlns:m="http://schemas.openxmlformats.org/officeDocument/2006/math" xmlns:a14="http://schemas.microsoft.com/office/drawing/2010/main" xmlns:ma14="http://schemas.microsoft.com/office/mac/drawingml/2011/main" val="1"/>
+              <ma14:wrappingTextBoxFlag xmlns:ma14="http://schemas.microsoft.com/office/mac/drawingml/2011/main" xmlns:a14="http://schemas.microsoft.com/office/drawing/2010/main" xmlns:m="http://schemas.openxmlformats.org/officeDocument/2006/math" xmlns="" val="1"/>
             </a:ext>
           </a:extLst>
         </p:spPr>
@@ -8851,7 +8851,7 @@
           </a:ln>
           <a:extLst>
             <a:ext uri="{C572A759-6A51-4108-AA02-DFA0A04FC94B}">
-              <ma14:wrappingTextBoxFlag xmlns="" xmlns:m="http://schemas.openxmlformats.org/officeDocument/2006/math" xmlns:a14="http://schemas.microsoft.com/office/drawing/2010/main" xmlns:ma14="http://schemas.microsoft.com/office/mac/drawingml/2011/main" val="1"/>
+              <ma14:wrappingTextBoxFlag xmlns:ma14="http://schemas.microsoft.com/office/mac/drawingml/2011/main" xmlns:a14="http://schemas.microsoft.com/office/drawing/2010/main" xmlns:m="http://schemas.openxmlformats.org/officeDocument/2006/math" xmlns="" val="1"/>
             </a:ext>
           </a:extLst>
         </p:spPr>
@@ -8964,7 +8964,7 @@
           </a:ln>
           <a:extLst>
             <a:ext uri="{C572A759-6A51-4108-AA02-DFA0A04FC94B}">
-              <ma14:wrappingTextBoxFlag xmlns="" xmlns:m="http://schemas.openxmlformats.org/officeDocument/2006/math" xmlns:a14="http://schemas.microsoft.com/office/drawing/2010/main" xmlns:ma14="http://schemas.microsoft.com/office/mac/drawingml/2011/main" val="1"/>
+              <ma14:wrappingTextBoxFlag xmlns:ma14="http://schemas.microsoft.com/office/mac/drawingml/2011/main" xmlns:a14="http://schemas.microsoft.com/office/drawing/2010/main" xmlns:m="http://schemas.openxmlformats.org/officeDocument/2006/math" xmlns="" val="1"/>
             </a:ext>
           </a:extLst>
         </p:spPr>
@@ -9029,7 +9029,7 @@
           </a:ln>
           <a:extLst>
             <a:ext uri="{C572A759-6A51-4108-AA02-DFA0A04FC94B}">
-              <ma14:wrappingTextBoxFlag xmlns="" xmlns:m="http://schemas.openxmlformats.org/officeDocument/2006/math" xmlns:a14="http://schemas.microsoft.com/office/drawing/2010/main" xmlns:ma14="http://schemas.microsoft.com/office/mac/drawingml/2011/main" val="1"/>
+              <ma14:wrappingTextBoxFlag xmlns:ma14="http://schemas.microsoft.com/office/mac/drawingml/2011/main" xmlns:a14="http://schemas.microsoft.com/office/drawing/2010/main" xmlns:m="http://schemas.openxmlformats.org/officeDocument/2006/math" xmlns="" val="1"/>
             </a:ext>
           </a:extLst>
         </p:spPr>
@@ -9207,7 +9207,7 @@
           </a:ln>
           <a:extLst>
             <a:ext uri="{C572A759-6A51-4108-AA02-DFA0A04FC94B}">
-              <ma14:wrappingTextBoxFlag xmlns="" xmlns:m="http://schemas.openxmlformats.org/officeDocument/2006/math" xmlns:a14="http://schemas.microsoft.com/office/drawing/2010/main" xmlns:ma14="http://schemas.microsoft.com/office/mac/drawingml/2011/main" val="1"/>
+              <ma14:wrappingTextBoxFlag xmlns:ma14="http://schemas.microsoft.com/office/mac/drawingml/2011/main" xmlns:a14="http://schemas.microsoft.com/office/drawing/2010/main" xmlns:m="http://schemas.openxmlformats.org/officeDocument/2006/math" xmlns="" val="1"/>
             </a:ext>
           </a:extLst>
         </p:spPr>
@@ -9242,7 +9242,7 @@
           </a:ln>
           <a:extLst>
             <a:ext uri="{C572A759-6A51-4108-AA02-DFA0A04FC94B}">
-              <ma14:wrappingTextBoxFlag xmlns="" xmlns:m="http://schemas.openxmlformats.org/officeDocument/2006/math" xmlns:a14="http://schemas.microsoft.com/office/drawing/2010/main" xmlns:ma14="http://schemas.microsoft.com/office/mac/drawingml/2011/main" val="1"/>
+              <ma14:wrappingTextBoxFlag xmlns:ma14="http://schemas.microsoft.com/office/mac/drawingml/2011/main" xmlns:a14="http://schemas.microsoft.com/office/drawing/2010/main" xmlns:m="http://schemas.openxmlformats.org/officeDocument/2006/math" xmlns="" val="1"/>
             </a:ext>
           </a:extLst>
         </p:spPr>
@@ -9277,7 +9277,7 @@
           </a:ln>
           <a:extLst>
             <a:ext uri="{C572A759-6A51-4108-AA02-DFA0A04FC94B}">
-              <ma14:wrappingTextBoxFlag xmlns="" xmlns:m="http://schemas.openxmlformats.org/officeDocument/2006/math" xmlns:a14="http://schemas.microsoft.com/office/drawing/2010/main" xmlns:ma14="http://schemas.microsoft.com/office/mac/drawingml/2011/main" val="1"/>
+              <ma14:wrappingTextBoxFlag xmlns:ma14="http://schemas.microsoft.com/office/mac/drawingml/2011/main" xmlns:a14="http://schemas.microsoft.com/office/drawing/2010/main" xmlns:m="http://schemas.openxmlformats.org/officeDocument/2006/math" xmlns="" val="1"/>
             </a:ext>
           </a:extLst>
         </p:spPr>
@@ -9316,7 +9316,7 @@
           </a:ln>
           <a:extLst>
             <a:ext uri="{C572A759-6A51-4108-AA02-DFA0A04FC94B}">
-              <ma14:wrappingTextBoxFlag xmlns="" xmlns:m="http://schemas.openxmlformats.org/officeDocument/2006/math" xmlns:a14="http://schemas.microsoft.com/office/drawing/2010/main" xmlns:ma14="http://schemas.microsoft.com/office/mac/drawingml/2011/main" val="1"/>
+              <ma14:wrappingTextBoxFlag xmlns:ma14="http://schemas.microsoft.com/office/mac/drawingml/2011/main" xmlns:a14="http://schemas.microsoft.com/office/drawing/2010/main" xmlns:m="http://schemas.openxmlformats.org/officeDocument/2006/math" xmlns="" val="1"/>
             </a:ext>
           </a:extLst>
         </p:spPr>
@@ -9363,7 +9363,7 @@
           </a:ln>
           <a:extLst>
             <a:ext uri="{C572A759-6A51-4108-AA02-DFA0A04FC94B}">
-              <ma14:wrappingTextBoxFlag xmlns="" xmlns:m="http://schemas.openxmlformats.org/officeDocument/2006/math" xmlns:a14="http://schemas.microsoft.com/office/drawing/2010/main" xmlns:ma14="http://schemas.microsoft.com/office/mac/drawingml/2011/main" val="1"/>
+              <ma14:wrappingTextBoxFlag xmlns:ma14="http://schemas.microsoft.com/office/mac/drawingml/2011/main" xmlns:a14="http://schemas.microsoft.com/office/drawing/2010/main" xmlns:m="http://schemas.openxmlformats.org/officeDocument/2006/math" xmlns="" val="1"/>
             </a:ext>
           </a:extLst>
         </p:spPr>
@@ -9402,7 +9402,7 @@
           </a:ln>
           <a:extLst>
             <a:ext uri="{C572A759-6A51-4108-AA02-DFA0A04FC94B}">
-              <ma14:wrappingTextBoxFlag xmlns="" xmlns:m="http://schemas.openxmlformats.org/officeDocument/2006/math" xmlns:a14="http://schemas.microsoft.com/office/drawing/2010/main" xmlns:ma14="http://schemas.microsoft.com/office/mac/drawingml/2011/main" val="1"/>
+              <ma14:wrappingTextBoxFlag xmlns:ma14="http://schemas.microsoft.com/office/mac/drawingml/2011/main" xmlns:a14="http://schemas.microsoft.com/office/drawing/2010/main" xmlns:m="http://schemas.openxmlformats.org/officeDocument/2006/math" xmlns="" val="1"/>
             </a:ext>
           </a:extLst>
         </p:spPr>
@@ -9543,7 +9543,7 @@
           </a:ln>
           <a:extLst>
             <a:ext uri="{C572A759-6A51-4108-AA02-DFA0A04FC94B}">
-              <ma14:wrappingTextBoxFlag xmlns="" xmlns:m="http://schemas.openxmlformats.org/officeDocument/2006/math" xmlns:a14="http://schemas.microsoft.com/office/drawing/2010/main" xmlns:ma14="http://schemas.microsoft.com/office/mac/drawingml/2011/main" val="1"/>
+              <ma14:wrappingTextBoxFlag xmlns:ma14="http://schemas.microsoft.com/office/mac/drawingml/2011/main" xmlns:a14="http://schemas.microsoft.com/office/drawing/2010/main" xmlns:m="http://schemas.openxmlformats.org/officeDocument/2006/math" xmlns="" val="1"/>
             </a:ext>
           </a:extLst>
         </p:spPr>
@@ -9578,7 +9578,7 @@
           </a:ln>
           <a:extLst>
             <a:ext uri="{C572A759-6A51-4108-AA02-DFA0A04FC94B}">
-              <ma14:wrappingTextBoxFlag xmlns="" xmlns:m="http://schemas.openxmlformats.org/officeDocument/2006/math" xmlns:a14="http://schemas.microsoft.com/office/drawing/2010/main" xmlns:ma14="http://schemas.microsoft.com/office/mac/drawingml/2011/main" val="1"/>
+              <ma14:wrappingTextBoxFlag xmlns:ma14="http://schemas.microsoft.com/office/mac/drawingml/2011/main" xmlns:a14="http://schemas.microsoft.com/office/drawing/2010/main" xmlns:m="http://schemas.openxmlformats.org/officeDocument/2006/math" xmlns="" val="1"/>
             </a:ext>
           </a:extLst>
         </p:spPr>
@@ -9747,7 +9747,7 @@
           </a:ln>
           <a:extLst>
             <a:ext uri="{C572A759-6A51-4108-AA02-DFA0A04FC94B}">
-              <ma14:wrappingTextBoxFlag xmlns="" xmlns:m="http://schemas.openxmlformats.org/officeDocument/2006/math" xmlns:a14="http://schemas.microsoft.com/office/drawing/2010/main" xmlns:ma14="http://schemas.microsoft.com/office/mac/drawingml/2011/main" val="1"/>
+              <ma14:wrappingTextBoxFlag xmlns:ma14="http://schemas.microsoft.com/office/mac/drawingml/2011/main" xmlns:a14="http://schemas.microsoft.com/office/drawing/2010/main" xmlns:m="http://schemas.openxmlformats.org/officeDocument/2006/math" xmlns="" val="1"/>
             </a:ext>
           </a:extLst>
         </p:spPr>
@@ -9841,7 +9841,7 @@
           </a:ln>
           <a:extLst>
             <a:ext uri="{C572A759-6A51-4108-AA02-DFA0A04FC94B}">
-              <ma14:wrappingTextBoxFlag xmlns="" xmlns:m="http://schemas.openxmlformats.org/officeDocument/2006/math" xmlns:a14="http://schemas.microsoft.com/office/drawing/2010/main" xmlns:ma14="http://schemas.microsoft.com/office/mac/drawingml/2011/main" val="1"/>
+              <ma14:wrappingTextBoxFlag xmlns:ma14="http://schemas.microsoft.com/office/mac/drawingml/2011/main" xmlns:a14="http://schemas.microsoft.com/office/drawing/2010/main" xmlns:m="http://schemas.openxmlformats.org/officeDocument/2006/math" xmlns="" val="1"/>
             </a:ext>
           </a:extLst>
         </p:spPr>
@@ -9883,7 +9883,7 @@
           </a:ln>
           <a:extLst>
             <a:ext uri="{C572A759-6A51-4108-AA02-DFA0A04FC94B}">
-              <ma14:wrappingTextBoxFlag xmlns="" xmlns:m="http://schemas.openxmlformats.org/officeDocument/2006/math" xmlns:a14="http://schemas.microsoft.com/office/drawing/2010/main" xmlns:ma14="http://schemas.microsoft.com/office/mac/drawingml/2011/main" val="1"/>
+              <ma14:wrappingTextBoxFlag xmlns:ma14="http://schemas.microsoft.com/office/mac/drawingml/2011/main" xmlns:a14="http://schemas.microsoft.com/office/drawing/2010/main" xmlns:m="http://schemas.openxmlformats.org/officeDocument/2006/math" xmlns="" val="1"/>
             </a:ext>
           </a:extLst>
         </p:spPr>
@@ -9930,7 +9930,7 @@
           </a:ln>
           <a:extLst>
             <a:ext uri="{C572A759-6A51-4108-AA02-DFA0A04FC94B}">
-              <ma14:wrappingTextBoxFlag xmlns="" xmlns:m="http://schemas.openxmlformats.org/officeDocument/2006/math" xmlns:a14="http://schemas.microsoft.com/office/drawing/2010/main" xmlns:ma14="http://schemas.microsoft.com/office/mac/drawingml/2011/main" val="1"/>
+              <ma14:wrappingTextBoxFlag xmlns:ma14="http://schemas.microsoft.com/office/mac/drawingml/2011/main" xmlns:a14="http://schemas.microsoft.com/office/drawing/2010/main" xmlns:m="http://schemas.openxmlformats.org/officeDocument/2006/math" xmlns="" val="1"/>
             </a:ext>
           </a:extLst>
         </p:spPr>
@@ -9974,7 +9974,7 @@
           </a:ln>
           <a:extLst>
             <a:ext uri="{C572A759-6A51-4108-AA02-DFA0A04FC94B}">
-              <ma14:wrappingTextBoxFlag xmlns="" xmlns:m="http://schemas.openxmlformats.org/officeDocument/2006/math" xmlns:a14="http://schemas.microsoft.com/office/drawing/2010/main" xmlns:ma14="http://schemas.microsoft.com/office/mac/drawingml/2011/main" val="1"/>
+              <ma14:wrappingTextBoxFlag xmlns:ma14="http://schemas.microsoft.com/office/mac/drawingml/2011/main" xmlns:a14="http://schemas.microsoft.com/office/drawing/2010/main" xmlns:m="http://schemas.openxmlformats.org/officeDocument/2006/math" xmlns="" val="1"/>
             </a:ext>
           </a:extLst>
         </p:spPr>
@@ -10087,7 +10087,7 @@
           </a:ln>
           <a:extLst>
             <a:ext uri="{C572A759-6A51-4108-AA02-DFA0A04FC94B}">
-              <ma14:wrappingTextBoxFlag xmlns="" xmlns:m="http://schemas.openxmlformats.org/officeDocument/2006/math" xmlns:a14="http://schemas.microsoft.com/office/drawing/2010/main" xmlns:ma14="http://schemas.microsoft.com/office/mac/drawingml/2011/main" val="1"/>
+              <ma14:wrappingTextBoxFlag xmlns:ma14="http://schemas.microsoft.com/office/mac/drawingml/2011/main" xmlns:a14="http://schemas.microsoft.com/office/drawing/2010/main" xmlns:m="http://schemas.openxmlformats.org/officeDocument/2006/math" xmlns="" val="1"/>
             </a:ext>
           </a:extLst>
         </p:spPr>
@@ -10256,7 +10256,7 @@
           </a:ln>
           <a:extLst>
             <a:ext uri="{C572A759-6A51-4108-AA02-DFA0A04FC94B}">
-              <ma14:wrappingTextBoxFlag xmlns="" xmlns:m="http://schemas.openxmlformats.org/officeDocument/2006/math" xmlns:a14="http://schemas.microsoft.com/office/drawing/2010/main" xmlns:ma14="http://schemas.microsoft.com/office/mac/drawingml/2011/main" val="1"/>
+              <ma14:wrappingTextBoxFlag xmlns:ma14="http://schemas.microsoft.com/office/mac/drawingml/2011/main" xmlns:a14="http://schemas.microsoft.com/office/drawing/2010/main" xmlns:m="http://schemas.openxmlformats.org/officeDocument/2006/math" xmlns="" val="1"/>
             </a:ext>
           </a:extLst>
         </p:spPr>
@@ -10291,7 +10291,7 @@
           </a:ln>
           <a:extLst>
             <a:ext uri="{C572A759-6A51-4108-AA02-DFA0A04FC94B}">
-              <ma14:wrappingTextBoxFlag xmlns="" xmlns:m="http://schemas.openxmlformats.org/officeDocument/2006/math" xmlns:a14="http://schemas.microsoft.com/office/drawing/2010/main" xmlns:ma14="http://schemas.microsoft.com/office/mac/drawingml/2011/main" val="1"/>
+              <ma14:wrappingTextBoxFlag xmlns:ma14="http://schemas.microsoft.com/office/mac/drawingml/2011/main" xmlns:a14="http://schemas.microsoft.com/office/drawing/2010/main" xmlns:m="http://schemas.openxmlformats.org/officeDocument/2006/math" xmlns="" val="1"/>
             </a:ext>
           </a:extLst>
         </p:spPr>
@@ -10460,7 +10460,7 @@
           </a:ln>
           <a:extLst>
             <a:ext uri="{C572A759-6A51-4108-AA02-DFA0A04FC94B}">
-              <ma14:wrappingTextBoxFlag xmlns="" xmlns:m="http://schemas.openxmlformats.org/officeDocument/2006/math" xmlns:a14="http://schemas.microsoft.com/office/drawing/2010/main" xmlns:ma14="http://schemas.microsoft.com/office/mac/drawingml/2011/main" val="1"/>
+              <ma14:wrappingTextBoxFlag xmlns:ma14="http://schemas.microsoft.com/office/mac/drawingml/2011/main" xmlns:a14="http://schemas.microsoft.com/office/drawing/2010/main" xmlns:m="http://schemas.openxmlformats.org/officeDocument/2006/math" xmlns="" val="1"/>
             </a:ext>
           </a:extLst>
         </p:spPr>
@@ -10554,7 +10554,7 @@
           </a:ln>
           <a:extLst>
             <a:ext uri="{C572A759-6A51-4108-AA02-DFA0A04FC94B}">
-              <ma14:wrappingTextBoxFlag xmlns="" xmlns:m="http://schemas.openxmlformats.org/officeDocument/2006/math" xmlns:a14="http://schemas.microsoft.com/office/drawing/2010/main" xmlns:ma14="http://schemas.microsoft.com/office/mac/drawingml/2011/main" val="1"/>
+              <ma14:wrappingTextBoxFlag xmlns:ma14="http://schemas.microsoft.com/office/mac/drawingml/2011/main" xmlns:a14="http://schemas.microsoft.com/office/drawing/2010/main" xmlns:m="http://schemas.openxmlformats.org/officeDocument/2006/math" xmlns="" val="1"/>
             </a:ext>
           </a:extLst>
         </p:spPr>
@@ -10596,7 +10596,7 @@
           </a:ln>
           <a:extLst>
             <a:ext uri="{C572A759-6A51-4108-AA02-DFA0A04FC94B}">
-              <ma14:wrappingTextBoxFlag xmlns="" xmlns:m="http://schemas.openxmlformats.org/officeDocument/2006/math" xmlns:a14="http://schemas.microsoft.com/office/drawing/2010/main" xmlns:ma14="http://schemas.microsoft.com/office/mac/drawingml/2011/main" val="1"/>
+              <ma14:wrappingTextBoxFlag xmlns:ma14="http://schemas.microsoft.com/office/mac/drawingml/2011/main" xmlns:a14="http://schemas.microsoft.com/office/drawing/2010/main" xmlns:m="http://schemas.openxmlformats.org/officeDocument/2006/math" xmlns="" val="1"/>
             </a:ext>
           </a:extLst>
         </p:spPr>
@@ -10643,7 +10643,7 @@
           </a:ln>
           <a:extLst>
             <a:ext uri="{C572A759-6A51-4108-AA02-DFA0A04FC94B}">
-              <ma14:wrappingTextBoxFlag xmlns="" xmlns:m="http://schemas.openxmlformats.org/officeDocument/2006/math" xmlns:a14="http://schemas.microsoft.com/office/drawing/2010/main" xmlns:ma14="http://schemas.microsoft.com/office/mac/drawingml/2011/main" val="1"/>
+              <ma14:wrappingTextBoxFlag xmlns:ma14="http://schemas.microsoft.com/office/mac/drawingml/2011/main" xmlns:a14="http://schemas.microsoft.com/office/drawing/2010/main" xmlns:m="http://schemas.openxmlformats.org/officeDocument/2006/math" xmlns="" val="1"/>
             </a:ext>
           </a:extLst>
         </p:spPr>
@@ -10729,7 +10729,7 @@
           </a:ln>
           <a:extLst>
             <a:ext uri="{C572A759-6A51-4108-AA02-DFA0A04FC94B}">
-              <ma14:wrappingTextBoxFlag xmlns="" xmlns:m="http://schemas.openxmlformats.org/officeDocument/2006/math" xmlns:a14="http://schemas.microsoft.com/office/drawing/2010/main" xmlns:ma14="http://schemas.microsoft.com/office/mac/drawingml/2011/main" val="1"/>
+              <ma14:wrappingTextBoxFlag xmlns:ma14="http://schemas.microsoft.com/office/mac/drawingml/2011/main" xmlns:a14="http://schemas.microsoft.com/office/drawing/2010/main" xmlns:m="http://schemas.openxmlformats.org/officeDocument/2006/math" xmlns="" val="1"/>
             </a:ext>
           </a:extLst>
         </p:spPr>
@@ -10842,7 +10842,7 @@
           </a:ln>
           <a:extLst>
             <a:ext uri="{C572A759-6A51-4108-AA02-DFA0A04FC94B}">
-              <ma14:wrappingTextBoxFlag xmlns="" xmlns:m="http://schemas.openxmlformats.org/officeDocument/2006/math" xmlns:a14="http://schemas.microsoft.com/office/drawing/2010/main" xmlns:ma14="http://schemas.microsoft.com/office/mac/drawingml/2011/main" val="1"/>
+              <ma14:wrappingTextBoxFlag xmlns:ma14="http://schemas.microsoft.com/office/mac/drawingml/2011/main" xmlns:a14="http://schemas.microsoft.com/office/drawing/2010/main" xmlns:m="http://schemas.openxmlformats.org/officeDocument/2006/math" xmlns="" val="1"/>
             </a:ext>
           </a:extLst>
         </p:spPr>
@@ -10917,7 +10917,7 @@
           </a:ln>
           <a:extLst>
             <a:ext uri="{C572A759-6A51-4108-AA02-DFA0A04FC94B}">
-              <ma14:wrappingTextBoxFlag xmlns="" xmlns:m="http://schemas.openxmlformats.org/officeDocument/2006/math" xmlns:a14="http://schemas.microsoft.com/office/drawing/2010/main" xmlns:ma14="http://schemas.microsoft.com/office/mac/drawingml/2011/main" val="1"/>
+              <ma14:wrappingTextBoxFlag xmlns:ma14="http://schemas.microsoft.com/office/mac/drawingml/2011/main" xmlns:a14="http://schemas.microsoft.com/office/drawing/2010/main" xmlns:m="http://schemas.openxmlformats.org/officeDocument/2006/math" xmlns="" val="1"/>
             </a:ext>
           </a:extLst>
         </p:spPr>
@@ -11092,7 +11092,7 @@
           </a:effectLst>
           <a:extLst>
             <a:ext uri="{C572A759-6A51-4108-AA02-DFA0A04FC94B}">
-              <ma14:wrappingTextBoxFlag xmlns="" xmlns:m="http://schemas.openxmlformats.org/officeDocument/2006/math" xmlns:a14="http://schemas.microsoft.com/office/drawing/2010/main" xmlns:ma14="http://schemas.microsoft.com/office/mac/drawingml/2011/main" val="1"/>
+              <ma14:wrappingTextBoxFlag xmlns:ma14="http://schemas.microsoft.com/office/mac/drawingml/2011/main" xmlns:a14="http://schemas.microsoft.com/office/drawing/2010/main" xmlns:m="http://schemas.openxmlformats.org/officeDocument/2006/math" xmlns="" val="1"/>
             </a:ext>
           </a:extLst>
         </p:spPr>
@@ -11149,7 +11149,7 @@
           </a:effectLst>
           <a:extLst>
             <a:ext uri="{C572A759-6A51-4108-AA02-DFA0A04FC94B}">
-              <ma14:wrappingTextBoxFlag xmlns="" xmlns:m="http://schemas.openxmlformats.org/officeDocument/2006/math" xmlns:a14="http://schemas.microsoft.com/office/drawing/2010/main" xmlns:ma14="http://schemas.microsoft.com/office/mac/drawingml/2011/main" val="1"/>
+              <ma14:wrappingTextBoxFlag xmlns:ma14="http://schemas.microsoft.com/office/mac/drawingml/2011/main" xmlns:a14="http://schemas.microsoft.com/office/drawing/2010/main" xmlns:m="http://schemas.openxmlformats.org/officeDocument/2006/math" xmlns="" val="1"/>
             </a:ext>
           </a:extLst>
         </p:spPr>
@@ -11191,7 +11191,7 @@
           </a:ln>
           <a:extLst>
             <a:ext uri="{C572A759-6A51-4108-AA02-DFA0A04FC94B}">
-              <ma14:wrappingTextBoxFlag xmlns="" xmlns:m="http://schemas.openxmlformats.org/officeDocument/2006/math" xmlns:a14="http://schemas.microsoft.com/office/drawing/2010/main" xmlns:ma14="http://schemas.microsoft.com/office/mac/drawingml/2011/main" val="1"/>
+              <ma14:wrappingTextBoxFlag xmlns:ma14="http://schemas.microsoft.com/office/mac/drawingml/2011/main" xmlns:a14="http://schemas.microsoft.com/office/drawing/2010/main" xmlns:m="http://schemas.openxmlformats.org/officeDocument/2006/math" xmlns="" val="1"/>
             </a:ext>
           </a:extLst>
         </p:spPr>
@@ -11230,7 +11230,7 @@
           </a:ln>
           <a:extLst>
             <a:ext uri="{C572A759-6A51-4108-AA02-DFA0A04FC94B}">
-              <ma14:wrappingTextBoxFlag xmlns="" xmlns:m="http://schemas.openxmlformats.org/officeDocument/2006/math" xmlns:a14="http://schemas.microsoft.com/office/drawing/2010/main" xmlns:ma14="http://schemas.microsoft.com/office/mac/drawingml/2011/main" val="1"/>
+              <ma14:wrappingTextBoxFlag xmlns:ma14="http://schemas.microsoft.com/office/mac/drawingml/2011/main" xmlns:a14="http://schemas.microsoft.com/office/drawing/2010/main" xmlns:m="http://schemas.openxmlformats.org/officeDocument/2006/math" xmlns="" val="1"/>
             </a:ext>
           </a:extLst>
         </p:spPr>
@@ -11316,8 +11316,13 @@
             </a:r>
             <a:r>
               <a:rPr dirty="0"/>
-              <a:t>: Number Count</a:t>
-            </a:r>
+              <a:t>: </a:t>
+            </a:r>
+            <a:r>
+              <a:rPr lang="en-US" dirty="0"/>
+              <a:t>Sum of numbers (simple JSON)</a:t>
+            </a:r>
+            <a:endParaRPr dirty="0"/>
           </a:p>
         </p:txBody>
       </p:sp>
@@ -11477,7 +11482,7 @@
           </a:ln>
           <a:extLst>
             <a:ext uri="{C572A759-6A51-4108-AA02-DFA0A04FC94B}">
-              <ma14:wrappingTextBoxFlag xmlns="" xmlns:m="http://schemas.openxmlformats.org/officeDocument/2006/math" xmlns:a14="http://schemas.microsoft.com/office/drawing/2010/main" xmlns:ma14="http://schemas.microsoft.com/office/mac/drawingml/2011/main" val="1"/>
+              <ma14:wrappingTextBoxFlag xmlns:ma14="http://schemas.microsoft.com/office/mac/drawingml/2011/main" xmlns:a14="http://schemas.microsoft.com/office/drawing/2010/main" xmlns:m="http://schemas.openxmlformats.org/officeDocument/2006/math" xmlns="" val="1"/>
             </a:ext>
           </a:extLst>
         </p:spPr>
@@ -11515,7 +11520,7 @@
           </a:ln>
           <a:extLst>
             <a:ext uri="{C572A759-6A51-4108-AA02-DFA0A04FC94B}">
-              <ma14:wrappingTextBoxFlag xmlns="" xmlns:m="http://schemas.openxmlformats.org/officeDocument/2006/math" xmlns:a14="http://schemas.microsoft.com/office/drawing/2010/main" xmlns:ma14="http://schemas.microsoft.com/office/mac/drawingml/2011/main" val="1"/>
+              <ma14:wrappingTextBoxFlag xmlns:ma14="http://schemas.microsoft.com/office/mac/drawingml/2011/main" xmlns:a14="http://schemas.microsoft.com/office/drawing/2010/main" xmlns:m="http://schemas.openxmlformats.org/officeDocument/2006/math" xmlns="" val="1"/>
             </a:ext>
           </a:extLst>
         </p:spPr>
@@ -11993,7 +11998,7 @@
           </a:ln>
           <a:extLst>
             <a:ext uri="{C572A759-6A51-4108-AA02-DFA0A04FC94B}">
-              <ma14:wrappingTextBoxFlag xmlns="" xmlns:m="http://schemas.openxmlformats.org/officeDocument/2006/math" xmlns:a14="http://schemas.microsoft.com/office/drawing/2010/main" xmlns:ma14="http://schemas.microsoft.com/office/mac/drawingml/2011/main" val="1"/>
+              <ma14:wrappingTextBoxFlag xmlns:ma14="http://schemas.microsoft.com/office/mac/drawingml/2011/main" xmlns:a14="http://schemas.microsoft.com/office/drawing/2010/main" xmlns:m="http://schemas.openxmlformats.org/officeDocument/2006/math" xmlns="" val="1"/>
             </a:ext>
           </a:extLst>
         </p:spPr>
@@ -12273,7 +12278,7 @@
           </a:ln>
           <a:extLst>
             <a:ext uri="{C572A759-6A51-4108-AA02-DFA0A04FC94B}">
-              <ma14:wrappingTextBoxFlag xmlns="" xmlns:m="http://schemas.openxmlformats.org/officeDocument/2006/math" xmlns:a14="http://schemas.microsoft.com/office/drawing/2010/main" xmlns:ma14="http://schemas.microsoft.com/office/mac/drawingml/2011/main" val="1"/>
+              <ma14:wrappingTextBoxFlag xmlns:ma14="http://schemas.microsoft.com/office/mac/drawingml/2011/main" xmlns:a14="http://schemas.microsoft.com/office/drawing/2010/main" xmlns:m="http://schemas.openxmlformats.org/officeDocument/2006/math" xmlns="" val="1"/>
             </a:ext>
           </a:extLst>
         </p:spPr>
@@ -12644,7 +12649,7 @@
           </a:ln>
           <a:extLst>
             <a:ext uri="{C572A759-6A51-4108-AA02-DFA0A04FC94B}">
-              <ma14:wrappingTextBoxFlag xmlns="" xmlns:m="http://schemas.openxmlformats.org/officeDocument/2006/math" xmlns:a14="http://schemas.microsoft.com/office/drawing/2010/main" xmlns:ma14="http://schemas.microsoft.com/office/mac/drawingml/2011/main" val="1"/>
+              <ma14:wrappingTextBoxFlag xmlns:ma14="http://schemas.microsoft.com/office/mac/drawingml/2011/main" xmlns:a14="http://schemas.microsoft.com/office/drawing/2010/main" xmlns:m="http://schemas.openxmlformats.org/officeDocument/2006/math" xmlns="" val="1"/>
             </a:ext>
           </a:extLst>
         </p:spPr>
@@ -12804,7 +12809,7 @@
           </a:ln>
           <a:extLst>
             <a:ext uri="{C572A759-6A51-4108-AA02-DFA0A04FC94B}">
-              <ma14:wrappingTextBoxFlag xmlns="" xmlns:m="http://schemas.openxmlformats.org/officeDocument/2006/math" xmlns:a14="http://schemas.microsoft.com/office/drawing/2010/main" xmlns:ma14="http://schemas.microsoft.com/office/mac/drawingml/2011/main" val="1"/>
+              <ma14:wrappingTextBoxFlag xmlns:ma14="http://schemas.microsoft.com/office/mac/drawingml/2011/main" xmlns:a14="http://schemas.microsoft.com/office/drawing/2010/main" xmlns:m="http://schemas.openxmlformats.org/officeDocument/2006/math" xmlns="" val="1"/>
             </a:ext>
           </a:extLst>
         </p:spPr>
@@ -13037,7 +13042,7 @@
           </a:ln>
           <a:extLst>
             <a:ext uri="{C572A759-6A51-4108-AA02-DFA0A04FC94B}">
-              <ma14:wrappingTextBoxFlag xmlns="" xmlns:m="http://schemas.openxmlformats.org/officeDocument/2006/math" xmlns:a14="http://schemas.microsoft.com/office/drawing/2010/main" xmlns:ma14="http://schemas.microsoft.com/office/mac/drawingml/2011/main" val="1"/>
+              <ma14:wrappingTextBoxFlag xmlns:ma14="http://schemas.microsoft.com/office/mac/drawingml/2011/main" xmlns:a14="http://schemas.microsoft.com/office/drawing/2010/main" xmlns:m="http://schemas.openxmlformats.org/officeDocument/2006/math" xmlns="" val="1"/>
             </a:ext>
           </a:extLst>
         </p:spPr>
@@ -13190,7 +13195,7 @@
           </a:ln>
           <a:extLst>
             <a:ext uri="{C572A759-6A51-4108-AA02-DFA0A04FC94B}">
-              <ma14:wrappingTextBoxFlag xmlns="" xmlns:m="http://schemas.openxmlformats.org/officeDocument/2006/math" xmlns:a14="http://schemas.microsoft.com/office/drawing/2010/main" xmlns:ma14="http://schemas.microsoft.com/office/mac/drawingml/2011/main" val="1"/>
+              <ma14:wrappingTextBoxFlag xmlns:ma14="http://schemas.microsoft.com/office/mac/drawingml/2011/main" xmlns:a14="http://schemas.microsoft.com/office/drawing/2010/main" xmlns:m="http://schemas.openxmlformats.org/officeDocument/2006/math" xmlns="" val="1"/>
             </a:ext>
           </a:extLst>
         </p:spPr>
@@ -13225,7 +13230,7 @@
           </a:ln>
           <a:extLst>
             <a:ext uri="{C572A759-6A51-4108-AA02-DFA0A04FC94B}">
-              <ma14:wrappingTextBoxFlag xmlns="" xmlns:m="http://schemas.openxmlformats.org/officeDocument/2006/math" xmlns:a14="http://schemas.microsoft.com/office/drawing/2010/main" xmlns:ma14="http://schemas.microsoft.com/office/mac/drawingml/2011/main" val="1"/>
+              <ma14:wrappingTextBoxFlag xmlns:ma14="http://schemas.microsoft.com/office/mac/drawingml/2011/main" xmlns:a14="http://schemas.microsoft.com/office/drawing/2010/main" xmlns:m="http://schemas.openxmlformats.org/officeDocument/2006/math" xmlns="" val="1"/>
             </a:ext>
           </a:extLst>
         </p:spPr>
@@ -13260,7 +13265,7 @@
           </a:ln>
           <a:extLst>
             <a:ext uri="{C572A759-6A51-4108-AA02-DFA0A04FC94B}">
-              <ma14:wrappingTextBoxFlag xmlns="" xmlns:m="http://schemas.openxmlformats.org/officeDocument/2006/math" xmlns:a14="http://schemas.microsoft.com/office/drawing/2010/main" xmlns:ma14="http://schemas.microsoft.com/office/mac/drawingml/2011/main" val="1"/>
+              <ma14:wrappingTextBoxFlag xmlns:ma14="http://schemas.microsoft.com/office/mac/drawingml/2011/main" xmlns:a14="http://schemas.microsoft.com/office/drawing/2010/main" xmlns:m="http://schemas.openxmlformats.org/officeDocument/2006/math" xmlns="" val="1"/>
             </a:ext>
           </a:extLst>
         </p:spPr>
@@ -13358,7 +13363,7 @@
           </a:ln>
           <a:extLst>
             <a:ext uri="{C572A759-6A51-4108-AA02-DFA0A04FC94B}">
-              <ma14:wrappingTextBoxFlag xmlns="" xmlns:m="http://schemas.openxmlformats.org/officeDocument/2006/math" xmlns:a14="http://schemas.microsoft.com/office/drawing/2010/main" xmlns:ma14="http://schemas.microsoft.com/office/mac/drawingml/2011/main" val="1"/>
+              <ma14:wrappingTextBoxFlag xmlns:ma14="http://schemas.microsoft.com/office/mac/drawingml/2011/main" xmlns:a14="http://schemas.microsoft.com/office/drawing/2010/main" xmlns:m="http://schemas.openxmlformats.org/officeDocument/2006/math" xmlns="" val="1"/>
             </a:ext>
           </a:extLst>
         </p:spPr>
@@ -13427,7 +13432,7 @@
           </a:ln>
           <a:extLst>
             <a:ext uri="{C572A759-6A51-4108-AA02-DFA0A04FC94B}">
-              <ma14:wrappingTextBoxFlag xmlns="" xmlns:m="http://schemas.openxmlformats.org/officeDocument/2006/math" xmlns:a14="http://schemas.microsoft.com/office/drawing/2010/main" xmlns:ma14="http://schemas.microsoft.com/office/mac/drawingml/2011/main" val="1"/>
+              <ma14:wrappingTextBoxFlag xmlns:ma14="http://schemas.microsoft.com/office/mac/drawingml/2011/main" xmlns:a14="http://schemas.microsoft.com/office/drawing/2010/main" xmlns:m="http://schemas.openxmlformats.org/officeDocument/2006/math" xmlns="" val="1"/>
             </a:ext>
           </a:extLst>
         </p:spPr>
@@ -13474,7 +13479,7 @@
           </a:ln>
           <a:extLst>
             <a:ext uri="{C572A759-6A51-4108-AA02-DFA0A04FC94B}">
-              <ma14:wrappingTextBoxFlag xmlns="" xmlns:m="http://schemas.openxmlformats.org/officeDocument/2006/math" xmlns:a14="http://schemas.microsoft.com/office/drawing/2010/main" xmlns:ma14="http://schemas.microsoft.com/office/mac/drawingml/2011/main" val="1"/>
+              <ma14:wrappingTextBoxFlag xmlns:ma14="http://schemas.microsoft.com/office/mac/drawingml/2011/main" xmlns:a14="http://schemas.microsoft.com/office/drawing/2010/main" xmlns:m="http://schemas.openxmlformats.org/officeDocument/2006/math" xmlns="" val="1"/>
             </a:ext>
           </a:extLst>
         </p:spPr>
@@ -13521,7 +13526,7 @@
           </a:ln>
           <a:extLst>
             <a:ext uri="{C572A759-6A51-4108-AA02-DFA0A04FC94B}">
-              <ma14:wrappingTextBoxFlag xmlns="" xmlns:m="http://schemas.openxmlformats.org/officeDocument/2006/math" xmlns:a14="http://schemas.microsoft.com/office/drawing/2010/main" xmlns:ma14="http://schemas.microsoft.com/office/mac/drawingml/2011/main" val="1"/>
+              <ma14:wrappingTextBoxFlag xmlns:ma14="http://schemas.microsoft.com/office/mac/drawingml/2011/main" xmlns:a14="http://schemas.microsoft.com/office/drawing/2010/main" xmlns:m="http://schemas.openxmlformats.org/officeDocument/2006/math" xmlns="" val="1"/>
             </a:ext>
           </a:extLst>
         </p:spPr>
@@ -13663,7 +13668,7 @@
           </a:ln>
           <a:extLst>
             <a:ext uri="{C572A759-6A51-4108-AA02-DFA0A04FC94B}">
-              <ma14:wrappingTextBoxFlag xmlns="" xmlns:m="http://schemas.openxmlformats.org/officeDocument/2006/math" xmlns:a14="http://schemas.microsoft.com/office/drawing/2010/main" xmlns:ma14="http://schemas.microsoft.com/office/mac/drawingml/2011/main" val="1"/>
+              <ma14:wrappingTextBoxFlag xmlns:ma14="http://schemas.microsoft.com/office/mac/drawingml/2011/main" xmlns:a14="http://schemas.microsoft.com/office/drawing/2010/main" xmlns:m="http://schemas.openxmlformats.org/officeDocument/2006/math" xmlns="" val="1"/>
             </a:ext>
           </a:extLst>
         </p:spPr>
@@ -13698,7 +13703,7 @@
           </a:ln>
           <a:extLst>
             <a:ext uri="{C572A759-6A51-4108-AA02-DFA0A04FC94B}">
-              <ma14:wrappingTextBoxFlag xmlns="" xmlns:m="http://schemas.openxmlformats.org/officeDocument/2006/math" xmlns:a14="http://schemas.microsoft.com/office/drawing/2010/main" xmlns:ma14="http://schemas.microsoft.com/office/mac/drawingml/2011/main" val="1"/>
+              <ma14:wrappingTextBoxFlag xmlns:ma14="http://schemas.microsoft.com/office/mac/drawingml/2011/main" xmlns:a14="http://schemas.microsoft.com/office/drawing/2010/main" xmlns:m="http://schemas.openxmlformats.org/officeDocument/2006/math" xmlns="" val="1"/>
             </a:ext>
           </a:extLst>
         </p:spPr>
@@ -13733,7 +13738,7 @@
           </a:ln>
           <a:extLst>
             <a:ext uri="{C572A759-6A51-4108-AA02-DFA0A04FC94B}">
-              <ma14:wrappingTextBoxFlag xmlns="" xmlns:m="http://schemas.openxmlformats.org/officeDocument/2006/math" xmlns:a14="http://schemas.microsoft.com/office/drawing/2010/main" xmlns:ma14="http://schemas.microsoft.com/office/mac/drawingml/2011/main" val="1"/>
+              <ma14:wrappingTextBoxFlag xmlns:ma14="http://schemas.microsoft.com/office/mac/drawingml/2011/main" xmlns:a14="http://schemas.microsoft.com/office/drawing/2010/main" xmlns:m="http://schemas.openxmlformats.org/officeDocument/2006/math" xmlns="" val="1"/>
             </a:ext>
           </a:extLst>
         </p:spPr>
@@ -13831,7 +13836,7 @@
           </a:ln>
           <a:extLst>
             <a:ext uri="{C572A759-6A51-4108-AA02-DFA0A04FC94B}">
-              <ma14:wrappingTextBoxFlag xmlns="" xmlns:m="http://schemas.openxmlformats.org/officeDocument/2006/math" xmlns:a14="http://schemas.microsoft.com/office/drawing/2010/main" xmlns:ma14="http://schemas.microsoft.com/office/mac/drawingml/2011/main" val="1"/>
+              <ma14:wrappingTextBoxFlag xmlns:ma14="http://schemas.microsoft.com/office/mac/drawingml/2011/main" xmlns:a14="http://schemas.microsoft.com/office/drawing/2010/main" xmlns:m="http://schemas.openxmlformats.org/officeDocument/2006/math" xmlns="" val="1"/>
             </a:ext>
           </a:extLst>
         </p:spPr>
@@ -13900,7 +13905,7 @@
           </a:ln>
           <a:extLst>
             <a:ext uri="{C572A759-6A51-4108-AA02-DFA0A04FC94B}">
-              <ma14:wrappingTextBoxFlag xmlns="" xmlns:m="http://schemas.openxmlformats.org/officeDocument/2006/math" xmlns:a14="http://schemas.microsoft.com/office/drawing/2010/main" xmlns:ma14="http://schemas.microsoft.com/office/mac/drawingml/2011/main" val="1"/>
+              <ma14:wrappingTextBoxFlag xmlns:ma14="http://schemas.microsoft.com/office/mac/drawingml/2011/main" xmlns:a14="http://schemas.microsoft.com/office/drawing/2010/main" xmlns:m="http://schemas.openxmlformats.org/officeDocument/2006/math" xmlns="" val="1"/>
             </a:ext>
           </a:extLst>
         </p:spPr>
@@ -13947,7 +13952,7 @@
           </a:ln>
           <a:extLst>
             <a:ext uri="{C572A759-6A51-4108-AA02-DFA0A04FC94B}">
-              <ma14:wrappingTextBoxFlag xmlns="" xmlns:m="http://schemas.openxmlformats.org/officeDocument/2006/math" xmlns:a14="http://schemas.microsoft.com/office/drawing/2010/main" xmlns:ma14="http://schemas.microsoft.com/office/mac/drawingml/2011/main" val="1"/>
+              <ma14:wrappingTextBoxFlag xmlns:ma14="http://schemas.microsoft.com/office/mac/drawingml/2011/main" xmlns:a14="http://schemas.microsoft.com/office/drawing/2010/main" xmlns:m="http://schemas.openxmlformats.org/officeDocument/2006/math" xmlns="" val="1"/>
             </a:ext>
           </a:extLst>
         </p:spPr>
@@ -13994,7 +13999,7 @@
           </a:ln>
           <a:extLst>
             <a:ext uri="{C572A759-6A51-4108-AA02-DFA0A04FC94B}">
-              <ma14:wrappingTextBoxFlag xmlns="" xmlns:m="http://schemas.openxmlformats.org/officeDocument/2006/math" xmlns:a14="http://schemas.microsoft.com/office/drawing/2010/main" xmlns:ma14="http://schemas.microsoft.com/office/mac/drawingml/2011/main" val="1"/>
+              <ma14:wrappingTextBoxFlag xmlns:ma14="http://schemas.microsoft.com/office/mac/drawingml/2011/main" xmlns:a14="http://schemas.microsoft.com/office/drawing/2010/main" xmlns:m="http://schemas.openxmlformats.org/officeDocument/2006/math" xmlns="" val="1"/>
             </a:ext>
           </a:extLst>
         </p:spPr>
@@ -14180,7 +14185,7 @@
           </a:ln>
           <a:extLst>
             <a:ext uri="{C572A759-6A51-4108-AA02-DFA0A04FC94B}">
-              <ma14:wrappingTextBoxFlag xmlns="" xmlns:m="http://schemas.openxmlformats.org/officeDocument/2006/math" xmlns:a14="http://schemas.microsoft.com/office/drawing/2010/main" xmlns:ma14="http://schemas.microsoft.com/office/mac/drawingml/2011/main" val="1"/>
+              <ma14:wrappingTextBoxFlag xmlns:ma14="http://schemas.microsoft.com/office/mac/drawingml/2011/main" xmlns:a14="http://schemas.microsoft.com/office/drawing/2010/main" xmlns:m="http://schemas.openxmlformats.org/officeDocument/2006/math" xmlns="" val="1"/>
             </a:ext>
           </a:extLst>
         </p:spPr>
@@ -14227,7 +14232,7 @@
           </a:ln>
           <a:extLst>
             <a:ext uri="{C572A759-6A51-4108-AA02-DFA0A04FC94B}">
-              <ma14:wrappingTextBoxFlag xmlns="" xmlns:m="http://schemas.openxmlformats.org/officeDocument/2006/math" xmlns:a14="http://schemas.microsoft.com/office/drawing/2010/main" xmlns:ma14="http://schemas.microsoft.com/office/mac/drawingml/2011/main" val="1"/>
+              <ma14:wrappingTextBoxFlag xmlns:ma14="http://schemas.microsoft.com/office/mac/drawingml/2011/main" xmlns:a14="http://schemas.microsoft.com/office/drawing/2010/main" xmlns:m="http://schemas.openxmlformats.org/officeDocument/2006/math" xmlns="" val="1"/>
             </a:ext>
           </a:extLst>
         </p:spPr>
@@ -14416,7 +14421,7 @@
           </a:ln>
           <a:extLst>
             <a:ext uri="{C572A759-6A51-4108-AA02-DFA0A04FC94B}">
-              <ma14:wrappingTextBoxFlag xmlns="" xmlns:m="http://schemas.openxmlformats.org/officeDocument/2006/math" xmlns:a14="http://schemas.microsoft.com/office/drawing/2010/main" xmlns:ma14="http://schemas.microsoft.com/office/mac/drawingml/2011/main" val="1"/>
+              <ma14:wrappingTextBoxFlag xmlns:ma14="http://schemas.microsoft.com/office/mac/drawingml/2011/main" xmlns:a14="http://schemas.microsoft.com/office/drawing/2010/main" xmlns:m="http://schemas.openxmlformats.org/officeDocument/2006/math" xmlns="" val="1"/>
             </a:ext>
           </a:extLst>
         </p:spPr>
@@ -14451,7 +14456,7 @@
           </a:ln>
           <a:extLst>
             <a:ext uri="{C572A759-6A51-4108-AA02-DFA0A04FC94B}">
-              <ma14:wrappingTextBoxFlag xmlns="" xmlns:m="http://schemas.openxmlformats.org/officeDocument/2006/math" xmlns:a14="http://schemas.microsoft.com/office/drawing/2010/main" xmlns:ma14="http://schemas.microsoft.com/office/mac/drawingml/2011/main" val="1"/>
+              <ma14:wrappingTextBoxFlag xmlns:ma14="http://schemas.microsoft.com/office/mac/drawingml/2011/main" xmlns:a14="http://schemas.microsoft.com/office/drawing/2010/main" xmlns:m="http://schemas.openxmlformats.org/officeDocument/2006/math" xmlns="" val="1"/>
             </a:ext>
           </a:extLst>
         </p:spPr>
@@ -14486,7 +14491,7 @@
           </a:ln>
           <a:extLst>
             <a:ext uri="{C572A759-6A51-4108-AA02-DFA0A04FC94B}">
-              <ma14:wrappingTextBoxFlag xmlns="" xmlns:m="http://schemas.openxmlformats.org/officeDocument/2006/math" xmlns:a14="http://schemas.microsoft.com/office/drawing/2010/main" xmlns:ma14="http://schemas.microsoft.com/office/mac/drawingml/2011/main" val="1"/>
+              <ma14:wrappingTextBoxFlag xmlns:ma14="http://schemas.microsoft.com/office/mac/drawingml/2011/main" xmlns:a14="http://schemas.microsoft.com/office/drawing/2010/main" xmlns:m="http://schemas.openxmlformats.org/officeDocument/2006/math" xmlns="" val="1"/>
             </a:ext>
           </a:extLst>
         </p:spPr>
@@ -14584,7 +14589,7 @@
           </a:ln>
           <a:extLst>
             <a:ext uri="{C572A759-6A51-4108-AA02-DFA0A04FC94B}">
-              <ma14:wrappingTextBoxFlag xmlns="" xmlns:m="http://schemas.openxmlformats.org/officeDocument/2006/math" xmlns:a14="http://schemas.microsoft.com/office/drawing/2010/main" xmlns:ma14="http://schemas.microsoft.com/office/mac/drawingml/2011/main" val="1"/>
+              <ma14:wrappingTextBoxFlag xmlns:ma14="http://schemas.microsoft.com/office/mac/drawingml/2011/main" xmlns:a14="http://schemas.microsoft.com/office/drawing/2010/main" xmlns:m="http://schemas.openxmlformats.org/officeDocument/2006/math" xmlns="" val="1"/>
             </a:ext>
           </a:extLst>
         </p:spPr>
@@ -14653,7 +14658,7 @@
           </a:ln>
           <a:extLst>
             <a:ext uri="{C572A759-6A51-4108-AA02-DFA0A04FC94B}">
-              <ma14:wrappingTextBoxFlag xmlns="" xmlns:m="http://schemas.openxmlformats.org/officeDocument/2006/math" xmlns:a14="http://schemas.microsoft.com/office/drawing/2010/main" xmlns:ma14="http://schemas.microsoft.com/office/mac/drawingml/2011/main" val="1"/>
+              <ma14:wrappingTextBoxFlag xmlns:ma14="http://schemas.microsoft.com/office/mac/drawingml/2011/main" xmlns:a14="http://schemas.microsoft.com/office/drawing/2010/main" xmlns:m="http://schemas.openxmlformats.org/officeDocument/2006/math" xmlns="" val="1"/>
             </a:ext>
           </a:extLst>
         </p:spPr>
@@ -14700,7 +14705,7 @@
           </a:ln>
           <a:extLst>
             <a:ext uri="{C572A759-6A51-4108-AA02-DFA0A04FC94B}">
-              <ma14:wrappingTextBoxFlag xmlns="" xmlns:m="http://schemas.openxmlformats.org/officeDocument/2006/math" xmlns:a14="http://schemas.microsoft.com/office/drawing/2010/main" xmlns:ma14="http://schemas.microsoft.com/office/mac/drawingml/2011/main" val="1"/>
+              <ma14:wrappingTextBoxFlag xmlns:ma14="http://schemas.microsoft.com/office/mac/drawingml/2011/main" xmlns:a14="http://schemas.microsoft.com/office/drawing/2010/main" xmlns:m="http://schemas.openxmlformats.org/officeDocument/2006/math" xmlns="" val="1"/>
             </a:ext>
           </a:extLst>
         </p:spPr>
@@ -14747,7 +14752,7 @@
           </a:ln>
           <a:extLst>
             <a:ext uri="{C572A759-6A51-4108-AA02-DFA0A04FC94B}">
-              <ma14:wrappingTextBoxFlag xmlns="" xmlns:m="http://schemas.openxmlformats.org/officeDocument/2006/math" xmlns:a14="http://schemas.microsoft.com/office/drawing/2010/main" xmlns:ma14="http://schemas.microsoft.com/office/mac/drawingml/2011/main" val="1"/>
+              <ma14:wrappingTextBoxFlag xmlns:ma14="http://schemas.microsoft.com/office/mac/drawingml/2011/main" xmlns:a14="http://schemas.microsoft.com/office/drawing/2010/main" xmlns:m="http://schemas.openxmlformats.org/officeDocument/2006/math" xmlns="" val="1"/>
             </a:ext>
           </a:extLst>
         </p:spPr>
@@ -14936,7 +14941,7 @@
           </a:ln>
           <a:extLst>
             <a:ext uri="{C572A759-6A51-4108-AA02-DFA0A04FC94B}">
-              <ma14:wrappingTextBoxFlag xmlns="" xmlns:m="http://schemas.openxmlformats.org/officeDocument/2006/math" xmlns:a14="http://schemas.microsoft.com/office/drawing/2010/main" xmlns:ma14="http://schemas.microsoft.com/office/mac/drawingml/2011/main" val="1"/>
+              <ma14:wrappingTextBoxFlag xmlns:ma14="http://schemas.microsoft.com/office/mac/drawingml/2011/main" xmlns:a14="http://schemas.microsoft.com/office/drawing/2010/main" xmlns:m="http://schemas.openxmlformats.org/officeDocument/2006/math" xmlns="" val="1"/>
             </a:ext>
           </a:extLst>
         </p:spPr>
@@ -15061,7 +15066,7 @@
           </a:ln>
           <a:extLst>
             <a:ext uri="{C572A759-6A51-4108-AA02-DFA0A04FC94B}">
-              <ma14:wrappingTextBoxFlag xmlns="" xmlns:m="http://schemas.openxmlformats.org/officeDocument/2006/math" xmlns:a14="http://schemas.microsoft.com/office/drawing/2010/main" xmlns:ma14="http://schemas.microsoft.com/office/mac/drawingml/2011/main" val="1"/>
+              <ma14:wrappingTextBoxFlag xmlns:ma14="http://schemas.microsoft.com/office/mac/drawingml/2011/main" xmlns:a14="http://schemas.microsoft.com/office/drawing/2010/main" xmlns:m="http://schemas.openxmlformats.org/officeDocument/2006/math" xmlns="" val="1"/>
             </a:ext>
           </a:extLst>
         </p:spPr>
@@ -15108,7 +15113,7 @@
           </a:ln>
           <a:extLst>
             <a:ext uri="{C572A759-6A51-4108-AA02-DFA0A04FC94B}">
-              <ma14:wrappingTextBoxFlag xmlns="" xmlns:m="http://schemas.openxmlformats.org/officeDocument/2006/math" xmlns:a14="http://schemas.microsoft.com/office/drawing/2010/main" xmlns:ma14="http://schemas.microsoft.com/office/mac/drawingml/2011/main" val="1"/>
+              <ma14:wrappingTextBoxFlag xmlns:ma14="http://schemas.microsoft.com/office/mac/drawingml/2011/main" xmlns:a14="http://schemas.microsoft.com/office/drawing/2010/main" xmlns:m="http://schemas.openxmlformats.org/officeDocument/2006/math" xmlns="" val="1"/>
             </a:ext>
           </a:extLst>
         </p:spPr>
@@ -15386,7 +15391,7 @@
           </a:ln>
           <a:extLst>
             <a:ext uri="{C572A759-6A51-4108-AA02-DFA0A04FC94B}">
-              <ma14:wrappingTextBoxFlag xmlns="" xmlns:m="http://schemas.openxmlformats.org/officeDocument/2006/math" xmlns:a14="http://schemas.microsoft.com/office/drawing/2010/main" xmlns:ma14="http://schemas.microsoft.com/office/mac/drawingml/2011/main" val="1"/>
+              <ma14:wrappingTextBoxFlag xmlns:ma14="http://schemas.microsoft.com/office/mac/drawingml/2011/main" xmlns:a14="http://schemas.microsoft.com/office/drawing/2010/main" xmlns:m="http://schemas.openxmlformats.org/officeDocument/2006/math" xmlns="" val="1"/>
             </a:ext>
           </a:extLst>
         </p:spPr>
@@ -15421,7 +15426,7 @@
           </a:ln>
           <a:extLst>
             <a:ext uri="{C572A759-6A51-4108-AA02-DFA0A04FC94B}">
-              <ma14:wrappingTextBoxFlag xmlns="" xmlns:m="http://schemas.openxmlformats.org/officeDocument/2006/math" xmlns:a14="http://schemas.microsoft.com/office/drawing/2010/main" xmlns:ma14="http://schemas.microsoft.com/office/mac/drawingml/2011/main" val="1"/>
+              <ma14:wrappingTextBoxFlag xmlns:ma14="http://schemas.microsoft.com/office/mac/drawingml/2011/main" xmlns:a14="http://schemas.microsoft.com/office/drawing/2010/main" xmlns:m="http://schemas.openxmlformats.org/officeDocument/2006/math" xmlns="" val="1"/>
             </a:ext>
           </a:extLst>
         </p:spPr>
@@ -15456,7 +15461,7 @@
           </a:ln>
           <a:extLst>
             <a:ext uri="{C572A759-6A51-4108-AA02-DFA0A04FC94B}">
-              <ma14:wrappingTextBoxFlag xmlns="" xmlns:m="http://schemas.openxmlformats.org/officeDocument/2006/math" xmlns:a14="http://schemas.microsoft.com/office/drawing/2010/main" xmlns:ma14="http://schemas.microsoft.com/office/mac/drawingml/2011/main" val="1"/>
+              <ma14:wrappingTextBoxFlag xmlns:ma14="http://schemas.microsoft.com/office/mac/drawingml/2011/main" xmlns:a14="http://schemas.microsoft.com/office/drawing/2010/main" xmlns:m="http://schemas.openxmlformats.org/officeDocument/2006/math" xmlns="" val="1"/>
             </a:ext>
           </a:extLst>
         </p:spPr>
@@ -15554,7 +15559,7 @@
           </a:ln>
           <a:extLst>
             <a:ext uri="{C572A759-6A51-4108-AA02-DFA0A04FC94B}">
-              <ma14:wrappingTextBoxFlag xmlns="" xmlns:m="http://schemas.openxmlformats.org/officeDocument/2006/math" xmlns:a14="http://schemas.microsoft.com/office/drawing/2010/main" xmlns:ma14="http://schemas.microsoft.com/office/mac/drawingml/2011/main" val="1"/>
+              <ma14:wrappingTextBoxFlag xmlns:ma14="http://schemas.microsoft.com/office/mac/drawingml/2011/main" xmlns:a14="http://schemas.microsoft.com/office/drawing/2010/main" xmlns:m="http://schemas.openxmlformats.org/officeDocument/2006/math" xmlns="" val="1"/>
             </a:ext>
           </a:extLst>
         </p:spPr>
@@ -15623,7 +15628,7 @@
           </a:ln>
           <a:extLst>
             <a:ext uri="{C572A759-6A51-4108-AA02-DFA0A04FC94B}">
-              <ma14:wrappingTextBoxFlag xmlns="" xmlns:m="http://schemas.openxmlformats.org/officeDocument/2006/math" xmlns:a14="http://schemas.microsoft.com/office/drawing/2010/main" xmlns:ma14="http://schemas.microsoft.com/office/mac/drawingml/2011/main" val="1"/>
+              <ma14:wrappingTextBoxFlag xmlns:ma14="http://schemas.microsoft.com/office/mac/drawingml/2011/main" xmlns:a14="http://schemas.microsoft.com/office/drawing/2010/main" xmlns:m="http://schemas.openxmlformats.org/officeDocument/2006/math" xmlns="" val="1"/>
             </a:ext>
           </a:extLst>
         </p:spPr>
@@ -15670,7 +15675,7 @@
           </a:ln>
           <a:extLst>
             <a:ext uri="{C572A759-6A51-4108-AA02-DFA0A04FC94B}">
-              <ma14:wrappingTextBoxFlag xmlns="" xmlns:m="http://schemas.openxmlformats.org/officeDocument/2006/math" xmlns:a14="http://schemas.microsoft.com/office/drawing/2010/main" xmlns:ma14="http://schemas.microsoft.com/office/mac/drawingml/2011/main" val="1"/>
+              <ma14:wrappingTextBoxFlag xmlns:ma14="http://schemas.microsoft.com/office/mac/drawingml/2011/main" xmlns:a14="http://schemas.microsoft.com/office/drawing/2010/main" xmlns:m="http://schemas.openxmlformats.org/officeDocument/2006/math" xmlns="" val="1"/>
             </a:ext>
           </a:extLst>
         </p:spPr>
@@ -15717,7 +15722,7 @@
           </a:ln>
           <a:extLst>
             <a:ext uri="{C572A759-6A51-4108-AA02-DFA0A04FC94B}">
-              <ma14:wrappingTextBoxFlag xmlns="" xmlns:m="http://schemas.openxmlformats.org/officeDocument/2006/math" xmlns:a14="http://schemas.microsoft.com/office/drawing/2010/main" xmlns:ma14="http://schemas.microsoft.com/office/mac/drawingml/2011/main" val="1"/>
+              <ma14:wrappingTextBoxFlag xmlns:ma14="http://schemas.microsoft.com/office/mac/drawingml/2011/main" xmlns:a14="http://schemas.microsoft.com/office/drawing/2010/main" xmlns:m="http://schemas.openxmlformats.org/officeDocument/2006/math" xmlns="" val="1"/>
             </a:ext>
           </a:extLst>
         </p:spPr>
@@ -15903,7 +15908,7 @@
           </a:ln>
           <a:extLst>
             <a:ext uri="{C572A759-6A51-4108-AA02-DFA0A04FC94B}">
-              <ma14:wrappingTextBoxFlag xmlns="" xmlns:m="http://schemas.openxmlformats.org/officeDocument/2006/math" xmlns:a14="http://schemas.microsoft.com/office/drawing/2010/main" xmlns:ma14="http://schemas.microsoft.com/office/mac/drawingml/2011/main" val="1"/>
+              <ma14:wrappingTextBoxFlag xmlns:ma14="http://schemas.microsoft.com/office/mac/drawingml/2011/main" xmlns:a14="http://schemas.microsoft.com/office/drawing/2010/main" xmlns:m="http://schemas.openxmlformats.org/officeDocument/2006/math" xmlns="" val="1"/>
             </a:ext>
           </a:extLst>
         </p:spPr>
@@ -15995,7 +16000,7 @@
           </a:ln>
           <a:extLst>
             <a:ext uri="{C572A759-6A51-4108-AA02-DFA0A04FC94B}">
-              <ma14:wrappingTextBoxFlag xmlns="" xmlns:m="http://schemas.openxmlformats.org/officeDocument/2006/math" xmlns:a14="http://schemas.microsoft.com/office/drawing/2010/main" xmlns:ma14="http://schemas.microsoft.com/office/mac/drawingml/2011/main" val="1"/>
+              <ma14:wrappingTextBoxFlag xmlns:ma14="http://schemas.microsoft.com/office/mac/drawingml/2011/main" xmlns:a14="http://schemas.microsoft.com/office/drawing/2010/main" xmlns:m="http://schemas.openxmlformats.org/officeDocument/2006/math" xmlns="" val="1"/>
             </a:ext>
           </a:extLst>
         </p:spPr>
@@ -16120,7 +16125,7 @@
           </a:ln>
           <a:extLst>
             <a:ext uri="{C572A759-6A51-4108-AA02-DFA0A04FC94B}">
-              <ma14:wrappingTextBoxFlag xmlns="" xmlns:m="http://schemas.openxmlformats.org/officeDocument/2006/math" xmlns:a14="http://schemas.microsoft.com/office/drawing/2010/main" xmlns:ma14="http://schemas.microsoft.com/office/mac/drawingml/2011/main" val="1"/>
+              <ma14:wrappingTextBoxFlag xmlns:ma14="http://schemas.microsoft.com/office/mac/drawingml/2011/main" xmlns:a14="http://schemas.microsoft.com/office/drawing/2010/main" xmlns:m="http://schemas.openxmlformats.org/officeDocument/2006/math" xmlns="" val="1"/>
             </a:ext>
           </a:extLst>
         </p:spPr>
@@ -16230,7 +16235,7 @@
           </a:ln>
           <a:extLst>
             <a:ext uri="{C572A759-6A51-4108-AA02-DFA0A04FC94B}">
-              <ma14:wrappingTextBoxFlag xmlns="" xmlns:m="http://schemas.openxmlformats.org/officeDocument/2006/math" xmlns:a14="http://schemas.microsoft.com/office/drawing/2010/main" xmlns:ma14="http://schemas.microsoft.com/office/mac/drawingml/2011/main" val="1"/>
+              <ma14:wrappingTextBoxFlag xmlns:ma14="http://schemas.microsoft.com/office/mac/drawingml/2011/main" xmlns:a14="http://schemas.microsoft.com/office/drawing/2010/main" xmlns:m="http://schemas.openxmlformats.org/officeDocument/2006/math" xmlns="" val="1"/>
             </a:ext>
           </a:extLst>
         </p:spPr>
@@ -16348,7 +16353,7 @@
           </a:ln>
           <a:extLst>
             <a:ext uri="{C572A759-6A51-4108-AA02-DFA0A04FC94B}">
-              <ma14:wrappingTextBoxFlag xmlns="" xmlns:m="http://schemas.openxmlformats.org/officeDocument/2006/math" xmlns:a14="http://schemas.microsoft.com/office/drawing/2010/main" xmlns:ma14="http://schemas.microsoft.com/office/mac/drawingml/2011/main" val="1"/>
+              <ma14:wrappingTextBoxFlag xmlns:ma14="http://schemas.microsoft.com/office/mac/drawingml/2011/main" xmlns:a14="http://schemas.microsoft.com/office/drawing/2010/main" xmlns:m="http://schemas.openxmlformats.org/officeDocument/2006/math" xmlns="" val="1"/>
             </a:ext>
           </a:extLst>
         </p:spPr>
@@ -16580,7 +16585,7 @@
           </a:ln>
           <a:extLst>
             <a:ext uri="{C572A759-6A51-4108-AA02-DFA0A04FC94B}">
-              <ma14:wrappingTextBoxFlag xmlns="" xmlns:m="http://schemas.openxmlformats.org/officeDocument/2006/math" xmlns:a14="http://schemas.microsoft.com/office/drawing/2010/main" xmlns:ma14="http://schemas.microsoft.com/office/mac/drawingml/2011/main" val="1"/>
+              <ma14:wrappingTextBoxFlag xmlns:ma14="http://schemas.microsoft.com/office/mac/drawingml/2011/main" xmlns:a14="http://schemas.microsoft.com/office/drawing/2010/main" xmlns:m="http://schemas.openxmlformats.org/officeDocument/2006/math" xmlns="" val="1"/>
             </a:ext>
           </a:extLst>
         </p:spPr>
@@ -16615,7 +16620,7 @@
           </a:ln>
           <a:extLst>
             <a:ext uri="{C572A759-6A51-4108-AA02-DFA0A04FC94B}">
-              <ma14:wrappingTextBoxFlag xmlns="" xmlns:m="http://schemas.openxmlformats.org/officeDocument/2006/math" xmlns:a14="http://schemas.microsoft.com/office/drawing/2010/main" xmlns:ma14="http://schemas.microsoft.com/office/mac/drawingml/2011/main" val="1"/>
+              <ma14:wrappingTextBoxFlag xmlns:ma14="http://schemas.microsoft.com/office/mac/drawingml/2011/main" xmlns:a14="http://schemas.microsoft.com/office/drawing/2010/main" xmlns:m="http://schemas.openxmlformats.org/officeDocument/2006/math" xmlns="" val="1"/>
             </a:ext>
           </a:extLst>
         </p:spPr>
@@ -16650,7 +16655,7 @@
           </a:ln>
           <a:extLst>
             <a:ext uri="{C572A759-6A51-4108-AA02-DFA0A04FC94B}">
-              <ma14:wrappingTextBoxFlag xmlns="" xmlns:m="http://schemas.openxmlformats.org/officeDocument/2006/math" xmlns:a14="http://schemas.microsoft.com/office/drawing/2010/main" xmlns:ma14="http://schemas.microsoft.com/office/mac/drawingml/2011/main" val="1"/>
+              <ma14:wrappingTextBoxFlag xmlns:ma14="http://schemas.microsoft.com/office/mac/drawingml/2011/main" xmlns:a14="http://schemas.microsoft.com/office/drawing/2010/main" xmlns:m="http://schemas.openxmlformats.org/officeDocument/2006/math" xmlns="" val="1"/>
             </a:ext>
           </a:extLst>
         </p:spPr>
@@ -16748,7 +16753,7 @@
           </a:ln>
           <a:extLst>
             <a:ext uri="{C572A759-6A51-4108-AA02-DFA0A04FC94B}">
-              <ma14:wrappingTextBoxFlag xmlns="" xmlns:m="http://schemas.openxmlformats.org/officeDocument/2006/math" xmlns:a14="http://schemas.microsoft.com/office/drawing/2010/main" xmlns:ma14="http://schemas.microsoft.com/office/mac/drawingml/2011/main" val="1"/>
+              <ma14:wrappingTextBoxFlag xmlns:ma14="http://schemas.microsoft.com/office/mac/drawingml/2011/main" xmlns:a14="http://schemas.microsoft.com/office/drawing/2010/main" xmlns:m="http://schemas.openxmlformats.org/officeDocument/2006/math" xmlns="" val="1"/>
             </a:ext>
           </a:extLst>
         </p:spPr>
@@ -16817,7 +16822,7 @@
           </a:ln>
           <a:extLst>
             <a:ext uri="{C572A759-6A51-4108-AA02-DFA0A04FC94B}">
-              <ma14:wrappingTextBoxFlag xmlns="" xmlns:m="http://schemas.openxmlformats.org/officeDocument/2006/math" xmlns:a14="http://schemas.microsoft.com/office/drawing/2010/main" xmlns:ma14="http://schemas.microsoft.com/office/mac/drawingml/2011/main" val="1"/>
+              <ma14:wrappingTextBoxFlag xmlns:ma14="http://schemas.microsoft.com/office/mac/drawingml/2011/main" xmlns:a14="http://schemas.microsoft.com/office/drawing/2010/main" xmlns:m="http://schemas.openxmlformats.org/officeDocument/2006/math" xmlns="" val="1"/>
             </a:ext>
           </a:extLst>
         </p:spPr>
@@ -16864,7 +16869,7 @@
           </a:ln>
           <a:extLst>
             <a:ext uri="{C572A759-6A51-4108-AA02-DFA0A04FC94B}">
-              <ma14:wrappingTextBoxFlag xmlns="" xmlns:m="http://schemas.openxmlformats.org/officeDocument/2006/math" xmlns:a14="http://schemas.microsoft.com/office/drawing/2010/main" xmlns:ma14="http://schemas.microsoft.com/office/mac/drawingml/2011/main" val="1"/>
+              <ma14:wrappingTextBoxFlag xmlns:ma14="http://schemas.microsoft.com/office/mac/drawingml/2011/main" xmlns:a14="http://schemas.microsoft.com/office/drawing/2010/main" xmlns:m="http://schemas.openxmlformats.org/officeDocument/2006/math" xmlns="" val="1"/>
             </a:ext>
           </a:extLst>
         </p:spPr>
@@ -16911,7 +16916,7 @@
           </a:ln>
           <a:extLst>
             <a:ext uri="{C572A759-6A51-4108-AA02-DFA0A04FC94B}">
-              <ma14:wrappingTextBoxFlag xmlns="" xmlns:m="http://schemas.openxmlformats.org/officeDocument/2006/math" xmlns:a14="http://schemas.microsoft.com/office/drawing/2010/main" xmlns:ma14="http://schemas.microsoft.com/office/mac/drawingml/2011/main" val="1"/>
+              <ma14:wrappingTextBoxFlag xmlns:ma14="http://schemas.microsoft.com/office/mac/drawingml/2011/main" xmlns:a14="http://schemas.microsoft.com/office/drawing/2010/main" xmlns:m="http://schemas.openxmlformats.org/officeDocument/2006/math" xmlns="" val="1"/>
             </a:ext>
           </a:extLst>
         </p:spPr>
@@ -17097,7 +17102,7 @@
           </a:ln>
           <a:extLst>
             <a:ext uri="{C572A759-6A51-4108-AA02-DFA0A04FC94B}">
-              <ma14:wrappingTextBoxFlag xmlns="" xmlns:m="http://schemas.openxmlformats.org/officeDocument/2006/math" xmlns:a14="http://schemas.microsoft.com/office/drawing/2010/main" xmlns:ma14="http://schemas.microsoft.com/office/mac/drawingml/2011/main" val="1"/>
+              <ma14:wrappingTextBoxFlag xmlns:ma14="http://schemas.microsoft.com/office/mac/drawingml/2011/main" xmlns:a14="http://schemas.microsoft.com/office/drawing/2010/main" xmlns:m="http://schemas.openxmlformats.org/officeDocument/2006/math" xmlns="" val="1"/>
             </a:ext>
           </a:extLst>
         </p:spPr>
@@ -17189,7 +17194,7 @@
           </a:ln>
           <a:extLst>
             <a:ext uri="{C572A759-6A51-4108-AA02-DFA0A04FC94B}">
-              <ma14:wrappingTextBoxFlag xmlns="" xmlns:m="http://schemas.openxmlformats.org/officeDocument/2006/math" xmlns:a14="http://schemas.microsoft.com/office/drawing/2010/main" xmlns:ma14="http://schemas.microsoft.com/office/mac/drawingml/2011/main" val="1"/>
+              <ma14:wrappingTextBoxFlag xmlns:ma14="http://schemas.microsoft.com/office/mac/drawingml/2011/main" xmlns:a14="http://schemas.microsoft.com/office/drawing/2010/main" xmlns:m="http://schemas.openxmlformats.org/officeDocument/2006/math" xmlns="" val="1"/>
             </a:ext>
           </a:extLst>
         </p:spPr>
@@ -17314,7 +17319,7 @@
           </a:ln>
           <a:extLst>
             <a:ext uri="{C572A759-6A51-4108-AA02-DFA0A04FC94B}">
-              <ma14:wrappingTextBoxFlag xmlns="" xmlns:m="http://schemas.openxmlformats.org/officeDocument/2006/math" xmlns:a14="http://schemas.microsoft.com/office/drawing/2010/main" xmlns:ma14="http://schemas.microsoft.com/office/mac/drawingml/2011/main" val="1"/>
+              <ma14:wrappingTextBoxFlag xmlns:ma14="http://schemas.microsoft.com/office/mac/drawingml/2011/main" xmlns:a14="http://schemas.microsoft.com/office/drawing/2010/main" xmlns:m="http://schemas.openxmlformats.org/officeDocument/2006/math" xmlns="" val="1"/>
             </a:ext>
           </a:extLst>
         </p:spPr>
@@ -17424,7 +17429,7 @@
           </a:ln>
           <a:extLst>
             <a:ext uri="{C572A759-6A51-4108-AA02-DFA0A04FC94B}">
-              <ma14:wrappingTextBoxFlag xmlns="" xmlns:m="http://schemas.openxmlformats.org/officeDocument/2006/math" xmlns:a14="http://schemas.microsoft.com/office/drawing/2010/main" xmlns:ma14="http://schemas.microsoft.com/office/mac/drawingml/2011/main" val="1"/>
+              <ma14:wrappingTextBoxFlag xmlns:ma14="http://schemas.microsoft.com/office/mac/drawingml/2011/main" xmlns:a14="http://schemas.microsoft.com/office/drawing/2010/main" xmlns:m="http://schemas.openxmlformats.org/officeDocument/2006/math" xmlns="" val="1"/>
             </a:ext>
           </a:extLst>
         </p:spPr>
@@ -17542,7 +17547,7 @@
           </a:ln>
           <a:extLst>
             <a:ext uri="{C572A759-6A51-4108-AA02-DFA0A04FC94B}">
-              <ma14:wrappingTextBoxFlag xmlns="" xmlns:m="http://schemas.openxmlformats.org/officeDocument/2006/math" xmlns:a14="http://schemas.microsoft.com/office/drawing/2010/main" xmlns:ma14="http://schemas.microsoft.com/office/mac/drawingml/2011/main" val="1"/>
+              <ma14:wrappingTextBoxFlag xmlns:ma14="http://schemas.microsoft.com/office/mac/drawingml/2011/main" xmlns:a14="http://schemas.microsoft.com/office/drawing/2010/main" xmlns:m="http://schemas.openxmlformats.org/officeDocument/2006/math" xmlns="" val="1"/>
             </a:ext>
           </a:extLst>
         </p:spPr>
@@ -17789,7 +17794,7 @@
           </a:ln>
           <a:extLst>
             <a:ext uri="{C572A759-6A51-4108-AA02-DFA0A04FC94B}">
-              <ma14:wrappingTextBoxFlag xmlns="" xmlns:m="http://schemas.openxmlformats.org/officeDocument/2006/math" xmlns:a14="http://schemas.microsoft.com/office/drawing/2010/main" xmlns:ma14="http://schemas.microsoft.com/office/mac/drawingml/2011/main" val="1"/>
+              <ma14:wrappingTextBoxFlag xmlns:ma14="http://schemas.microsoft.com/office/mac/drawingml/2011/main" xmlns:a14="http://schemas.microsoft.com/office/drawing/2010/main" xmlns:m="http://schemas.openxmlformats.org/officeDocument/2006/math" xmlns="" val="1"/>
             </a:ext>
           </a:extLst>
         </p:spPr>
@@ -17824,7 +17829,7 @@
           </a:ln>
           <a:extLst>
             <a:ext uri="{C572A759-6A51-4108-AA02-DFA0A04FC94B}">
-              <ma14:wrappingTextBoxFlag xmlns="" xmlns:m="http://schemas.openxmlformats.org/officeDocument/2006/math" xmlns:a14="http://schemas.microsoft.com/office/drawing/2010/main" xmlns:ma14="http://schemas.microsoft.com/office/mac/drawingml/2011/main" val="1"/>
+              <ma14:wrappingTextBoxFlag xmlns:ma14="http://schemas.microsoft.com/office/mac/drawingml/2011/main" xmlns:a14="http://schemas.microsoft.com/office/drawing/2010/main" xmlns:m="http://schemas.openxmlformats.org/officeDocument/2006/math" xmlns="" val="1"/>
             </a:ext>
           </a:extLst>
         </p:spPr>
@@ -17859,7 +17864,7 @@
           </a:ln>
           <a:extLst>
             <a:ext uri="{C572A759-6A51-4108-AA02-DFA0A04FC94B}">
-              <ma14:wrappingTextBoxFlag xmlns="" xmlns:m="http://schemas.openxmlformats.org/officeDocument/2006/math" xmlns:a14="http://schemas.microsoft.com/office/drawing/2010/main" xmlns:ma14="http://schemas.microsoft.com/office/mac/drawingml/2011/main" val="1"/>
+              <ma14:wrappingTextBoxFlag xmlns:ma14="http://schemas.microsoft.com/office/mac/drawingml/2011/main" xmlns:a14="http://schemas.microsoft.com/office/drawing/2010/main" xmlns:m="http://schemas.openxmlformats.org/officeDocument/2006/math" xmlns="" val="1"/>
             </a:ext>
           </a:extLst>
         </p:spPr>
@@ -17957,7 +17962,7 @@
           </a:ln>
           <a:extLst>
             <a:ext uri="{C572A759-6A51-4108-AA02-DFA0A04FC94B}">
-              <ma14:wrappingTextBoxFlag xmlns="" xmlns:m="http://schemas.openxmlformats.org/officeDocument/2006/math" xmlns:a14="http://schemas.microsoft.com/office/drawing/2010/main" xmlns:ma14="http://schemas.microsoft.com/office/mac/drawingml/2011/main" val="1"/>
+              <ma14:wrappingTextBoxFlag xmlns:ma14="http://schemas.microsoft.com/office/mac/drawingml/2011/main" xmlns:a14="http://schemas.microsoft.com/office/drawing/2010/main" xmlns:m="http://schemas.openxmlformats.org/officeDocument/2006/math" xmlns="" val="1"/>
             </a:ext>
           </a:extLst>
         </p:spPr>
@@ -18026,7 +18031,7 @@
           </a:ln>
           <a:extLst>
             <a:ext uri="{C572A759-6A51-4108-AA02-DFA0A04FC94B}">
-              <ma14:wrappingTextBoxFlag xmlns="" xmlns:m="http://schemas.openxmlformats.org/officeDocument/2006/math" xmlns:a14="http://schemas.microsoft.com/office/drawing/2010/main" xmlns:ma14="http://schemas.microsoft.com/office/mac/drawingml/2011/main" val="1"/>
+              <ma14:wrappingTextBoxFlag xmlns:ma14="http://schemas.microsoft.com/office/mac/drawingml/2011/main" xmlns:a14="http://schemas.microsoft.com/office/drawing/2010/main" xmlns:m="http://schemas.openxmlformats.org/officeDocument/2006/math" xmlns="" val="1"/>
             </a:ext>
           </a:extLst>
         </p:spPr>
@@ -18073,7 +18078,7 @@
           </a:ln>
           <a:extLst>
             <a:ext uri="{C572A759-6A51-4108-AA02-DFA0A04FC94B}">
-              <ma14:wrappingTextBoxFlag xmlns="" xmlns:m="http://schemas.openxmlformats.org/officeDocument/2006/math" xmlns:a14="http://schemas.microsoft.com/office/drawing/2010/main" xmlns:ma14="http://schemas.microsoft.com/office/mac/drawingml/2011/main" val="1"/>
+              <ma14:wrappingTextBoxFlag xmlns:ma14="http://schemas.microsoft.com/office/mac/drawingml/2011/main" xmlns:a14="http://schemas.microsoft.com/office/drawing/2010/main" xmlns:m="http://schemas.openxmlformats.org/officeDocument/2006/math" xmlns="" val="1"/>
             </a:ext>
           </a:extLst>
         </p:spPr>
@@ -18120,7 +18125,7 @@
           </a:ln>
           <a:extLst>
             <a:ext uri="{C572A759-6A51-4108-AA02-DFA0A04FC94B}">
-              <ma14:wrappingTextBoxFlag xmlns="" xmlns:m="http://schemas.openxmlformats.org/officeDocument/2006/math" xmlns:a14="http://schemas.microsoft.com/office/drawing/2010/main" xmlns:ma14="http://schemas.microsoft.com/office/mac/drawingml/2011/main" val="1"/>
+              <ma14:wrappingTextBoxFlag xmlns:ma14="http://schemas.microsoft.com/office/mac/drawingml/2011/main" xmlns:a14="http://schemas.microsoft.com/office/drawing/2010/main" xmlns:m="http://schemas.openxmlformats.org/officeDocument/2006/math" xmlns="" val="1"/>
             </a:ext>
           </a:extLst>
         </p:spPr>
@@ -18306,7 +18311,7 @@
           </a:ln>
           <a:extLst>
             <a:ext uri="{C572A759-6A51-4108-AA02-DFA0A04FC94B}">
-              <ma14:wrappingTextBoxFlag xmlns="" xmlns:m="http://schemas.openxmlformats.org/officeDocument/2006/math" xmlns:a14="http://schemas.microsoft.com/office/drawing/2010/main" xmlns:ma14="http://schemas.microsoft.com/office/mac/drawingml/2011/main" val="1"/>
+              <ma14:wrappingTextBoxFlag xmlns:ma14="http://schemas.microsoft.com/office/mac/drawingml/2011/main" xmlns:a14="http://schemas.microsoft.com/office/drawing/2010/main" xmlns:m="http://schemas.openxmlformats.org/officeDocument/2006/math" xmlns="" val="1"/>
             </a:ext>
           </a:extLst>
         </p:spPr>
@@ -18398,7 +18403,7 @@
           </a:ln>
           <a:extLst>
             <a:ext uri="{C572A759-6A51-4108-AA02-DFA0A04FC94B}">
-              <ma14:wrappingTextBoxFlag xmlns="" xmlns:m="http://schemas.openxmlformats.org/officeDocument/2006/math" xmlns:a14="http://schemas.microsoft.com/office/drawing/2010/main" xmlns:ma14="http://schemas.microsoft.com/office/mac/drawingml/2011/main" val="1"/>
+              <ma14:wrappingTextBoxFlag xmlns:ma14="http://schemas.microsoft.com/office/mac/drawingml/2011/main" xmlns:a14="http://schemas.microsoft.com/office/drawing/2010/main" xmlns:m="http://schemas.openxmlformats.org/officeDocument/2006/math" xmlns="" val="1"/>
             </a:ext>
           </a:extLst>
         </p:spPr>
@@ -18523,7 +18528,7 @@
           </a:ln>
           <a:extLst>
             <a:ext uri="{C572A759-6A51-4108-AA02-DFA0A04FC94B}">
-              <ma14:wrappingTextBoxFlag xmlns="" xmlns:m="http://schemas.openxmlformats.org/officeDocument/2006/math" xmlns:a14="http://schemas.microsoft.com/office/drawing/2010/main" xmlns:ma14="http://schemas.microsoft.com/office/mac/drawingml/2011/main" val="1"/>
+              <ma14:wrappingTextBoxFlag xmlns:ma14="http://schemas.microsoft.com/office/mac/drawingml/2011/main" xmlns:a14="http://schemas.microsoft.com/office/drawing/2010/main" xmlns:m="http://schemas.openxmlformats.org/officeDocument/2006/math" xmlns="" val="1"/>
             </a:ext>
           </a:extLst>
         </p:spPr>
@@ -18633,7 +18638,7 @@
           </a:ln>
           <a:extLst>
             <a:ext uri="{C572A759-6A51-4108-AA02-DFA0A04FC94B}">
-              <ma14:wrappingTextBoxFlag xmlns="" xmlns:m="http://schemas.openxmlformats.org/officeDocument/2006/math" xmlns:a14="http://schemas.microsoft.com/office/drawing/2010/main" xmlns:ma14="http://schemas.microsoft.com/office/mac/drawingml/2011/main" val="1"/>
+              <ma14:wrappingTextBoxFlag xmlns:ma14="http://schemas.microsoft.com/office/mac/drawingml/2011/main" xmlns:a14="http://schemas.microsoft.com/office/drawing/2010/main" xmlns:m="http://schemas.openxmlformats.org/officeDocument/2006/math" xmlns="" val="1"/>
             </a:ext>
           </a:extLst>
         </p:spPr>
@@ -18751,7 +18756,7 @@
           </a:ln>
           <a:extLst>
             <a:ext uri="{C572A759-6A51-4108-AA02-DFA0A04FC94B}">
-              <ma14:wrappingTextBoxFlag xmlns="" xmlns:m="http://schemas.openxmlformats.org/officeDocument/2006/math" xmlns:a14="http://schemas.microsoft.com/office/drawing/2010/main" xmlns:ma14="http://schemas.microsoft.com/office/mac/drawingml/2011/main" val="1"/>
+              <ma14:wrappingTextBoxFlag xmlns:ma14="http://schemas.microsoft.com/office/mac/drawingml/2011/main" xmlns:a14="http://schemas.microsoft.com/office/drawing/2010/main" xmlns:m="http://schemas.openxmlformats.org/officeDocument/2006/math" xmlns="" val="1"/>
             </a:ext>
           </a:extLst>
         </p:spPr>

</xml_diff>